<commit_message>
Removed use of 'hypothesis' and 'conclusion' as discussed during call.
</commit_message>
<xml_diff>
--- a/docs/papers/release/Figure 1.pptx
+++ b/docs/papers/release/Figure 1.pptx
@@ -194,7 +194,7 @@
             <a:fld id="{DCB0F01B-B7FE-4268-A005-AB7D5822BC14}" type="datetimeFigureOut">
               <a:rPr lang="en-US" smtClean="0"/>
               <a:pPr/>
-              <a:t>10/26/2009</a:t>
+              <a:t>11/4/2009</a:t>
             </a:fld>
             <a:endParaRPr lang="en-US"/>
           </a:p>
@@ -806,7 +806,7 @@
             <a:fld id="{1D8BD707-D9CF-40AE-B4C6-C98DA3205C09}" type="datetimeFigureOut">
               <a:rPr lang="en-US" smtClean="0"/>
               <a:pPr/>
-              <a:t>10/26/2009</a:t>
+              <a:t>11/4/2009</a:t>
             </a:fld>
             <a:endParaRPr lang="en-US"/>
           </a:p>
@@ -973,7 +973,7 @@
             <a:fld id="{1D8BD707-D9CF-40AE-B4C6-C98DA3205C09}" type="datetimeFigureOut">
               <a:rPr lang="en-US" smtClean="0"/>
               <a:pPr/>
-              <a:t>10/26/2009</a:t>
+              <a:t>11/4/2009</a:t>
             </a:fld>
             <a:endParaRPr lang="en-US"/>
           </a:p>
@@ -1150,7 +1150,7 @@
             <a:fld id="{1D8BD707-D9CF-40AE-B4C6-C98DA3205C09}" type="datetimeFigureOut">
               <a:rPr lang="en-US" smtClean="0"/>
               <a:pPr/>
-              <a:t>10/26/2009</a:t>
+              <a:t>11/4/2009</a:t>
             </a:fld>
             <a:endParaRPr lang="en-US"/>
           </a:p>
@@ -1317,7 +1317,7 @@
             <a:fld id="{1D8BD707-D9CF-40AE-B4C6-C98DA3205C09}" type="datetimeFigureOut">
               <a:rPr lang="en-US" smtClean="0"/>
               <a:pPr/>
-              <a:t>10/26/2009</a:t>
+              <a:t>11/4/2009</a:t>
             </a:fld>
             <a:endParaRPr lang="en-US"/>
           </a:p>
@@ -1560,7 +1560,7 @@
             <a:fld id="{1D8BD707-D9CF-40AE-B4C6-C98DA3205C09}" type="datetimeFigureOut">
               <a:rPr lang="en-US" smtClean="0"/>
               <a:pPr/>
-              <a:t>10/26/2009</a:t>
+              <a:t>11/4/2009</a:t>
             </a:fld>
             <a:endParaRPr lang="en-US"/>
           </a:p>
@@ -1845,7 +1845,7 @@
             <a:fld id="{1D8BD707-D9CF-40AE-B4C6-C98DA3205C09}" type="datetimeFigureOut">
               <a:rPr lang="en-US" smtClean="0"/>
               <a:pPr/>
-              <a:t>10/26/2009</a:t>
+              <a:t>11/4/2009</a:t>
             </a:fld>
             <a:endParaRPr lang="en-US"/>
           </a:p>
@@ -2264,7 +2264,7 @@
             <a:fld id="{1D8BD707-D9CF-40AE-B4C6-C98DA3205C09}" type="datetimeFigureOut">
               <a:rPr lang="en-US" smtClean="0"/>
               <a:pPr/>
-              <a:t>10/26/2009</a:t>
+              <a:t>11/4/2009</a:t>
             </a:fld>
             <a:endParaRPr lang="en-US"/>
           </a:p>
@@ -2379,7 +2379,7 @@
             <a:fld id="{1D8BD707-D9CF-40AE-B4C6-C98DA3205C09}" type="datetimeFigureOut">
               <a:rPr lang="en-US" smtClean="0"/>
               <a:pPr/>
-              <a:t>10/26/2009</a:t>
+              <a:t>11/4/2009</a:t>
             </a:fld>
             <a:endParaRPr lang="en-US"/>
           </a:p>
@@ -2471,7 +2471,7 @@
             <a:fld id="{1D8BD707-D9CF-40AE-B4C6-C98DA3205C09}" type="datetimeFigureOut">
               <a:rPr lang="en-US" smtClean="0"/>
               <a:pPr/>
-              <a:t>10/26/2009</a:t>
+              <a:t>11/4/2009</a:t>
             </a:fld>
             <a:endParaRPr lang="en-US"/>
           </a:p>
@@ -2745,7 +2745,7 @@
             <a:fld id="{1D8BD707-D9CF-40AE-B4C6-C98DA3205C09}" type="datetimeFigureOut">
               <a:rPr lang="en-US" smtClean="0"/>
               <a:pPr/>
-              <a:t>10/26/2009</a:t>
+              <a:t>11/4/2009</a:t>
             </a:fld>
             <a:endParaRPr lang="en-US"/>
           </a:p>
@@ -2995,7 +2995,7 @@
             <a:fld id="{1D8BD707-D9CF-40AE-B4C6-C98DA3205C09}" type="datetimeFigureOut">
               <a:rPr lang="en-US" smtClean="0"/>
               <a:pPr/>
-              <a:t>10/26/2009</a:t>
+              <a:t>11/4/2009</a:t>
             </a:fld>
             <a:endParaRPr lang="en-US"/>
           </a:p>
@@ -3205,7 +3205,7 @@
             <a:fld id="{1D8BD707-D9CF-40AE-B4C6-C98DA3205C09}" type="datetimeFigureOut">
               <a:rPr lang="en-US" smtClean="0"/>
               <a:pPr/>
-              <a:t>10/26/2009</a:t>
+              <a:t>11/4/2009</a:t>
             </a:fld>
             <a:endParaRPr lang="en-US"/>
           </a:p>
@@ -5471,7 +5471,7 @@
             <a:pPr algn="ctr"/>
             <a:r>
               <a:rPr lang="en-US" dirty="0" smtClean="0"/>
-              <a:t>hypothesis</a:t>
+              <a:t>plan specification</a:t>
             </a:r>
             <a:endParaRPr lang="en-US" dirty="0"/>
           </a:p>
@@ -5540,7 +5540,7 @@
       </p:grpSpPr>
       <p:pic>
         <p:nvPicPr>
-          <p:cNvPr id="1026" name="Picture 2"/>
+          <p:cNvPr id="2" name="Picture 2"/>
           <p:cNvPicPr>
             <a:picLocks noChangeAspect="1" noChangeArrowheads="1"/>
           </p:cNvPicPr>

</xml_diff>

<commit_message>
Add high-level structure hierarchy drawn by Jie
</commit_message>
<xml_diff>
--- a/docs/papers/release/Figure 1.pptx
+++ b/docs/papers/release/Figure 1.pptx
@@ -5,11 +5,12 @@
     <p:sldMasterId id="2147483648" r:id="rId1"/>
   </p:sldMasterIdLst>
   <p:notesMasterIdLst>
-    <p:notesMasterId r:id="rId4"/>
+    <p:notesMasterId r:id="rId5"/>
   </p:notesMasterIdLst>
   <p:sldIdLst>
-    <p:sldId id="256" r:id="rId2"/>
-    <p:sldId id="257" r:id="rId3"/>
+    <p:sldId id="258" r:id="rId2"/>
+    <p:sldId id="256" r:id="rId3"/>
+    <p:sldId id="257" r:id="rId4"/>
   </p:sldIdLst>
   <p:sldSz cx="9144000" cy="6858000" type="screen4x3"/>
   <p:notesSz cx="6858000" cy="9144000"/>
@@ -194,7 +195,7 @@
             <a:fld id="{DCB0F01B-B7FE-4268-A005-AB7D5822BC14}" type="datetimeFigureOut">
               <a:rPr lang="en-US" smtClean="0"/>
               <a:pPr/>
-              <a:t>7/26/2011</a:t>
+              <a:t>11/10/2014</a:t>
             </a:fld>
             <a:endParaRPr lang="en-US"/>
           </a:p>
@@ -363,6 +364,11 @@
         </p:txBody>
       </p:sp>
     </p:spTree>
+    <p:extLst>
+      <p:ext uri="{BB962C8B-B14F-4D97-AF65-F5344CB8AC3E}">
+        <p14:creationId xmlns:p14="http://schemas.microsoft.com/office/powerpoint/2010/main" val="3900501994"/>
+      </p:ext>
+    </p:extLst>
   </p:cSld>
   <p:clrMap bg1="lt1" tx1="dk1" bg2="lt2" tx2="dk2" accent1="accent1" accent2="accent2" accent3="accent3" accent4="accent4" accent5="accent5" accent6="accent6" hlink="hlink" folHlink="folHlink"/>
   <p:notesStyle>
@@ -528,7 +534,7 @@
             <a:fld id="{6B4D57C2-B9C7-4FE0-9DB9-7EC7F64D7582}" type="slidenum">
               <a:rPr lang="en-US" smtClean="0"/>
               <a:pPr/>
-              <a:t>1</a:t>
+              <a:t>2</a:t>
             </a:fld>
             <a:endParaRPr lang="en-US"/>
           </a:p>
@@ -610,7 +616,7 @@
             <a:fld id="{6B4D57C2-B9C7-4FE0-9DB9-7EC7F64D7582}" type="slidenum">
               <a:rPr lang="en-US" smtClean="0"/>
               <a:pPr/>
-              <a:t>2</a:t>
+              <a:t>3</a:t>
             </a:fld>
             <a:endParaRPr lang="en-US"/>
           </a:p>
@@ -806,7 +812,7 @@
             <a:fld id="{1D8BD707-D9CF-40AE-B4C6-C98DA3205C09}" type="datetimeFigureOut">
               <a:rPr lang="en-US" smtClean="0"/>
               <a:pPr/>
-              <a:t>7/26/2011</a:t>
+              <a:t>11/10/2014</a:t>
             </a:fld>
             <a:endParaRPr lang="en-US"/>
           </a:p>
@@ -973,7 +979,7 @@
             <a:fld id="{1D8BD707-D9CF-40AE-B4C6-C98DA3205C09}" type="datetimeFigureOut">
               <a:rPr lang="en-US" smtClean="0"/>
               <a:pPr/>
-              <a:t>7/26/2011</a:t>
+              <a:t>11/10/2014</a:t>
             </a:fld>
             <a:endParaRPr lang="en-US"/>
           </a:p>
@@ -1150,7 +1156,7 @@
             <a:fld id="{1D8BD707-D9CF-40AE-B4C6-C98DA3205C09}" type="datetimeFigureOut">
               <a:rPr lang="en-US" smtClean="0"/>
               <a:pPr/>
-              <a:t>7/26/2011</a:t>
+              <a:t>11/10/2014</a:t>
             </a:fld>
             <a:endParaRPr lang="en-US"/>
           </a:p>
@@ -1317,7 +1323,7 @@
             <a:fld id="{1D8BD707-D9CF-40AE-B4C6-C98DA3205C09}" type="datetimeFigureOut">
               <a:rPr lang="en-US" smtClean="0"/>
               <a:pPr/>
-              <a:t>7/26/2011</a:t>
+              <a:t>11/10/2014</a:t>
             </a:fld>
             <a:endParaRPr lang="en-US"/>
           </a:p>
@@ -1560,7 +1566,7 @@
             <a:fld id="{1D8BD707-D9CF-40AE-B4C6-C98DA3205C09}" type="datetimeFigureOut">
               <a:rPr lang="en-US" smtClean="0"/>
               <a:pPr/>
-              <a:t>7/26/2011</a:t>
+              <a:t>11/10/2014</a:t>
             </a:fld>
             <a:endParaRPr lang="en-US"/>
           </a:p>
@@ -1845,7 +1851,7 @@
             <a:fld id="{1D8BD707-D9CF-40AE-B4C6-C98DA3205C09}" type="datetimeFigureOut">
               <a:rPr lang="en-US" smtClean="0"/>
               <a:pPr/>
-              <a:t>7/26/2011</a:t>
+              <a:t>11/10/2014</a:t>
             </a:fld>
             <a:endParaRPr lang="en-US"/>
           </a:p>
@@ -2264,7 +2270,7 @@
             <a:fld id="{1D8BD707-D9CF-40AE-B4C6-C98DA3205C09}" type="datetimeFigureOut">
               <a:rPr lang="en-US" smtClean="0"/>
               <a:pPr/>
-              <a:t>7/26/2011</a:t>
+              <a:t>11/10/2014</a:t>
             </a:fld>
             <a:endParaRPr lang="en-US"/>
           </a:p>
@@ -2379,7 +2385,7 @@
             <a:fld id="{1D8BD707-D9CF-40AE-B4C6-C98DA3205C09}" type="datetimeFigureOut">
               <a:rPr lang="en-US" smtClean="0"/>
               <a:pPr/>
-              <a:t>7/26/2011</a:t>
+              <a:t>11/10/2014</a:t>
             </a:fld>
             <a:endParaRPr lang="en-US"/>
           </a:p>
@@ -2471,7 +2477,7 @@
             <a:fld id="{1D8BD707-D9CF-40AE-B4C6-C98DA3205C09}" type="datetimeFigureOut">
               <a:rPr lang="en-US" smtClean="0"/>
               <a:pPr/>
-              <a:t>7/26/2011</a:t>
+              <a:t>11/10/2014</a:t>
             </a:fld>
             <a:endParaRPr lang="en-US"/>
           </a:p>
@@ -2745,7 +2751,7 @@
             <a:fld id="{1D8BD707-D9CF-40AE-B4C6-C98DA3205C09}" type="datetimeFigureOut">
               <a:rPr lang="en-US" smtClean="0"/>
               <a:pPr/>
-              <a:t>7/26/2011</a:t>
+              <a:t>11/10/2014</a:t>
             </a:fld>
             <a:endParaRPr lang="en-US"/>
           </a:p>
@@ -2995,7 +3001,7 @@
             <a:fld id="{1D8BD707-D9CF-40AE-B4C6-C98DA3205C09}" type="datetimeFigureOut">
               <a:rPr lang="en-US" smtClean="0"/>
               <a:pPr/>
-              <a:t>7/26/2011</a:t>
+              <a:t>11/10/2014</a:t>
             </a:fld>
             <a:endParaRPr lang="en-US"/>
           </a:p>
@@ -3205,7 +3211,7 @@
             <a:fld id="{1D8BD707-D9CF-40AE-B4C6-C98DA3205C09}" type="datetimeFigureOut">
               <a:rPr lang="en-US" smtClean="0"/>
               <a:pPr/>
-              <a:t>7/26/2011</a:t>
+              <a:t>11/10/2014</a:t>
             </a:fld>
             <a:endParaRPr lang="en-US"/>
           </a:p>
@@ -3576,6 +3582,3541 @@
           <a:chExt cx="0" cy="0"/>
         </a:xfrm>
       </p:grpSpPr>
+      <p:grpSp>
+        <p:nvGrpSpPr>
+          <p:cNvPr id="2" name="Group 1"/>
+          <p:cNvGrpSpPr/>
+          <p:nvPr/>
+        </p:nvGrpSpPr>
+        <p:grpSpPr>
+          <a:xfrm>
+            <a:off x="170360" y="1066800"/>
+            <a:ext cx="8812004" cy="4957372"/>
+            <a:chOff x="170360" y="1371600"/>
+            <a:chExt cx="8812004" cy="4957372"/>
+          </a:xfrm>
+        </p:grpSpPr>
+        <p:grpSp>
+          <p:nvGrpSpPr>
+            <p:cNvPr id="3" name="Group 2"/>
+            <p:cNvGrpSpPr/>
+            <p:nvPr/>
+          </p:nvGrpSpPr>
+          <p:grpSpPr>
+            <a:xfrm>
+              <a:off x="170360" y="1371600"/>
+              <a:ext cx="8812004" cy="4957372"/>
+              <a:chOff x="179596" y="1295400"/>
+              <a:chExt cx="8812004" cy="4957372"/>
+            </a:xfrm>
+          </p:grpSpPr>
+          <p:grpSp>
+            <p:nvGrpSpPr>
+              <p:cNvPr id="8" name="Group 7"/>
+              <p:cNvGrpSpPr/>
+              <p:nvPr/>
+            </p:nvGrpSpPr>
+            <p:grpSpPr>
+              <a:xfrm>
+                <a:off x="8282010" y="1600386"/>
+                <a:ext cx="709590" cy="1523814"/>
+                <a:chOff x="8229600" y="1295586"/>
+                <a:chExt cx="709590" cy="1523814"/>
+              </a:xfrm>
+            </p:grpSpPr>
+            <p:sp>
+              <p:nvSpPr>
+                <p:cNvPr id="73" name="TextBox 72"/>
+                <p:cNvSpPr txBox="1"/>
+                <p:nvPr/>
+              </p:nvSpPr>
+              <p:spPr>
+                <a:xfrm>
+                  <a:off x="8231106" y="1295586"/>
+                  <a:ext cx="666230" cy="276999"/>
+                </a:xfrm>
+                <a:prstGeom prst="rect">
+                  <a:avLst/>
+                </a:prstGeom>
+                <a:solidFill>
+                  <a:schemeClr val="accent6">
+                    <a:lumMod val="75000"/>
+                  </a:schemeClr>
+                </a:solidFill>
+                <a:ln w="19050">
+                  <a:solidFill>
+                    <a:schemeClr val="tx2">
+                      <a:lumMod val="60000"/>
+                      <a:lumOff val="40000"/>
+                    </a:schemeClr>
+                  </a:solidFill>
+                  <a:headEnd type="none" w="med" len="med"/>
+                  <a:tailEnd type="triangle" w="med" len="med"/>
+                </a:ln>
+              </p:spPr>
+              <p:txBody>
+                <a:bodyPr wrap="square" rtlCol="0">
+                  <a:spAutoFit/>
+                </a:bodyPr>
+                <a:lstStyle/>
+                <a:p>
+                  <a:pPr algn="ctr"/>
+                  <a:r>
+                    <a:rPr lang="en-US" sz="1200" b="1" dirty="0" smtClean="0">
+                      <a:solidFill>
+                        <a:schemeClr val="bg1"/>
+                      </a:solidFill>
+                    </a:rPr>
+                    <a:t>BFO</a:t>
+                  </a:r>
+                </a:p>
+              </p:txBody>
+            </p:sp>
+            <p:sp>
+              <p:nvSpPr>
+                <p:cNvPr id="74" name="TextBox 73"/>
+                <p:cNvSpPr txBox="1"/>
+                <p:nvPr/>
+              </p:nvSpPr>
+              <p:spPr>
+                <a:xfrm>
+                  <a:off x="8229792" y="1609622"/>
+                  <a:ext cx="667544" cy="276999"/>
+                </a:xfrm>
+                <a:prstGeom prst="rect">
+                  <a:avLst/>
+                </a:prstGeom>
+                <a:solidFill>
+                  <a:srgbClr val="7030A0"/>
+                </a:solidFill>
+                <a:ln w="19050">
+                  <a:solidFill>
+                    <a:schemeClr val="tx2">
+                      <a:lumMod val="60000"/>
+                      <a:lumOff val="40000"/>
+                    </a:schemeClr>
+                  </a:solidFill>
+                  <a:headEnd type="none" w="med" len="med"/>
+                  <a:tailEnd type="triangle" w="med" len="med"/>
+                </a:ln>
+              </p:spPr>
+              <p:txBody>
+                <a:bodyPr wrap="square" rtlCol="0">
+                  <a:spAutoFit/>
+                </a:bodyPr>
+                <a:lstStyle/>
+                <a:p>
+                  <a:pPr algn="ctr"/>
+                  <a:r>
+                    <a:rPr lang="en-US" sz="1200" b="1" dirty="0" smtClean="0">
+                      <a:solidFill>
+                        <a:schemeClr val="bg1"/>
+                      </a:solidFill>
+                    </a:rPr>
+                    <a:t>IAO</a:t>
+                  </a:r>
+                </a:p>
+              </p:txBody>
+            </p:sp>
+            <p:sp>
+              <p:nvSpPr>
+                <p:cNvPr id="75" name="TextBox 74"/>
+                <p:cNvSpPr txBox="1"/>
+                <p:nvPr/>
+              </p:nvSpPr>
+              <p:spPr>
+                <a:xfrm>
+                  <a:off x="8230401" y="1925176"/>
+                  <a:ext cx="666935" cy="276999"/>
+                </a:xfrm>
+                <a:prstGeom prst="rect">
+                  <a:avLst/>
+                </a:prstGeom>
+                <a:solidFill>
+                  <a:srgbClr val="C00000"/>
+                </a:solidFill>
+                <a:ln w="19050">
+                  <a:solidFill>
+                    <a:schemeClr val="tx2">
+                      <a:lumMod val="60000"/>
+                      <a:lumOff val="40000"/>
+                    </a:schemeClr>
+                  </a:solidFill>
+                  <a:headEnd type="none" w="med" len="med"/>
+                  <a:tailEnd type="triangle" w="med" len="med"/>
+                </a:ln>
+              </p:spPr>
+              <p:txBody>
+                <a:bodyPr wrap="square" rtlCol="0">
+                  <a:spAutoFit/>
+                </a:bodyPr>
+                <a:lstStyle/>
+                <a:p>
+                  <a:pPr algn="ctr"/>
+                  <a:r>
+                    <a:rPr lang="en-US" sz="1200" b="1" dirty="0" smtClean="0">
+                      <a:solidFill>
+                        <a:schemeClr val="bg1"/>
+                      </a:solidFill>
+                    </a:rPr>
+                    <a:t>OBO</a:t>
+                  </a:r>
+                </a:p>
+              </p:txBody>
+            </p:sp>
+            <p:sp>
+              <p:nvSpPr>
+                <p:cNvPr id="76" name="TextBox 75"/>
+                <p:cNvSpPr txBox="1"/>
+                <p:nvPr/>
+              </p:nvSpPr>
+              <p:spPr>
+                <a:xfrm>
+                  <a:off x="8229600" y="2237601"/>
+                  <a:ext cx="667736" cy="276999"/>
+                </a:xfrm>
+                <a:prstGeom prst="rect">
+                  <a:avLst/>
+                </a:prstGeom>
+                <a:solidFill>
+                  <a:schemeClr val="accent1">
+                    <a:lumMod val="75000"/>
+                  </a:schemeClr>
+                </a:solidFill>
+                <a:ln w="19050">
+                  <a:solidFill>
+                    <a:schemeClr val="tx2">
+                      <a:lumMod val="60000"/>
+                      <a:lumOff val="40000"/>
+                    </a:schemeClr>
+                  </a:solidFill>
+                  <a:headEnd type="none" w="med" len="med"/>
+                  <a:tailEnd type="triangle" w="med" len="med"/>
+                </a:ln>
+              </p:spPr>
+              <p:txBody>
+                <a:bodyPr wrap="square" rtlCol="0">
+                  <a:spAutoFit/>
+                </a:bodyPr>
+                <a:lstStyle/>
+                <a:p>
+                  <a:pPr algn="ctr"/>
+                  <a:r>
+                    <a:rPr lang="en-US" sz="1200" b="1" dirty="0" smtClean="0">
+                      <a:solidFill>
+                        <a:schemeClr val="bg1"/>
+                      </a:solidFill>
+                    </a:rPr>
+                    <a:t>OBI</a:t>
+                  </a:r>
+                  <a:endParaRPr lang="en-US" sz="1200" b="1" dirty="0">
+                    <a:solidFill>
+                      <a:schemeClr val="bg1"/>
+                    </a:solidFill>
+                  </a:endParaRPr>
+                </a:p>
+              </p:txBody>
+            </p:sp>
+            <p:grpSp>
+              <p:nvGrpSpPr>
+                <p:cNvPr id="77" name="Group 76"/>
+                <p:cNvGrpSpPr/>
+                <p:nvPr/>
+              </p:nvGrpSpPr>
+              <p:grpSpPr>
+                <a:xfrm>
+                  <a:off x="8263935" y="2542401"/>
+                  <a:ext cx="675255" cy="276999"/>
+                  <a:chOff x="8263935" y="2609365"/>
+                  <a:chExt cx="675255" cy="276999"/>
+                </a:xfrm>
+              </p:grpSpPr>
+              <p:cxnSp>
+                <p:nvCxnSpPr>
+                  <p:cNvPr id="78" name="Straight Arrow Connector 77"/>
+                  <p:cNvCxnSpPr/>
+                  <p:nvPr/>
+                </p:nvCxnSpPr>
+                <p:spPr>
+                  <a:xfrm>
+                    <a:off x="8263935" y="2747864"/>
+                    <a:ext cx="271825" cy="0"/>
+                  </a:xfrm>
+                  <a:prstGeom prst="straightConnector1">
+                    <a:avLst/>
+                  </a:prstGeom>
+                  <a:ln w="19050">
+                    <a:headEnd type="none" w="med" len="med"/>
+                    <a:tailEnd type="triangle" w="med" len="med"/>
+                  </a:ln>
+                </p:spPr>
+                <p:style>
+                  <a:lnRef idx="1">
+                    <a:schemeClr val="accent1"/>
+                  </a:lnRef>
+                  <a:fillRef idx="0">
+                    <a:schemeClr val="accent1"/>
+                  </a:fillRef>
+                  <a:effectRef idx="0">
+                    <a:schemeClr val="accent1"/>
+                  </a:effectRef>
+                  <a:fontRef idx="minor">
+                    <a:schemeClr val="tx1"/>
+                  </a:fontRef>
+                </p:style>
+              </p:cxnSp>
+              <p:sp>
+                <p:nvSpPr>
+                  <p:cNvPr id="79" name="TextBox 78"/>
+                  <p:cNvSpPr txBox="1"/>
+                  <p:nvPr/>
+                </p:nvSpPr>
+                <p:spPr>
+                  <a:xfrm>
+                    <a:off x="8541324" y="2609365"/>
+                    <a:ext cx="397866" cy="276999"/>
+                  </a:xfrm>
+                  <a:prstGeom prst="rect">
+                    <a:avLst/>
+                  </a:prstGeom>
+                  <a:noFill/>
+                </p:spPr>
+                <p:txBody>
+                  <a:bodyPr wrap="none" rtlCol="0">
+                    <a:spAutoFit/>
+                  </a:bodyPr>
+                  <a:lstStyle/>
+                  <a:p>
+                    <a:r>
+                      <a:rPr lang="en-US" sz="1200" b="1" dirty="0" smtClean="0"/>
+                      <a:t>is a</a:t>
+                    </a:r>
+                    <a:endParaRPr lang="en-US" sz="1200" b="1" dirty="0"/>
+                  </a:p>
+                </p:txBody>
+              </p:sp>
+            </p:grpSp>
+          </p:grpSp>
+          <p:grpSp>
+            <p:nvGrpSpPr>
+              <p:cNvPr id="9" name="Group 8"/>
+              <p:cNvGrpSpPr/>
+              <p:nvPr/>
+            </p:nvGrpSpPr>
+            <p:grpSpPr>
+              <a:xfrm>
+                <a:off x="179596" y="1295400"/>
+                <a:ext cx="7973804" cy="4957372"/>
+                <a:chOff x="179596" y="1295400"/>
+                <a:chExt cx="7973804" cy="4957372"/>
+              </a:xfrm>
+            </p:grpSpPr>
+            <p:sp>
+              <p:nvSpPr>
+                <p:cNvPr id="10" name="TextBox 9"/>
+                <p:cNvSpPr txBox="1"/>
+                <p:nvPr/>
+              </p:nvSpPr>
+              <p:spPr>
+                <a:xfrm>
+                  <a:off x="179596" y="3826858"/>
+                  <a:ext cx="582404" cy="276999"/>
+                </a:xfrm>
+                <a:prstGeom prst="rect">
+                  <a:avLst/>
+                </a:prstGeom>
+                <a:solidFill>
+                  <a:schemeClr val="accent6">
+                    <a:lumMod val="75000"/>
+                  </a:schemeClr>
+                </a:solidFill>
+                <a:ln w="19050">
+                  <a:solidFill>
+                    <a:schemeClr val="tx2">
+                      <a:lumMod val="60000"/>
+                      <a:lumOff val="40000"/>
+                    </a:schemeClr>
+                  </a:solidFill>
+                  <a:headEnd type="none" w="med" len="med"/>
+                  <a:tailEnd type="triangle" w="med" len="med"/>
+                </a:ln>
+              </p:spPr>
+              <p:txBody>
+                <a:bodyPr wrap="none" rtlCol="0">
+                  <a:spAutoFit/>
+                </a:bodyPr>
+                <a:lstStyle/>
+                <a:p>
+                  <a:pPr algn="ctr"/>
+                  <a:r>
+                    <a:rPr lang="en-US" sz="1200" dirty="0">
+                      <a:solidFill>
+                        <a:schemeClr val="bg1"/>
+                      </a:solidFill>
+                    </a:rPr>
+                    <a:t>e</a:t>
+                  </a:r>
+                  <a:r>
+                    <a:rPr lang="en-US" sz="1200" dirty="0" smtClean="0">
+                      <a:solidFill>
+                        <a:schemeClr val="bg1"/>
+                      </a:solidFill>
+                    </a:rPr>
+                    <a:t>ntity </a:t>
+                  </a:r>
+                </a:p>
+              </p:txBody>
+            </p:sp>
+            <p:sp>
+              <p:nvSpPr>
+                <p:cNvPr id="11" name="TextBox 10"/>
+                <p:cNvSpPr txBox="1"/>
+                <p:nvPr/>
+              </p:nvSpPr>
+              <p:spPr>
+                <a:xfrm>
+                  <a:off x="1044765" y="2590707"/>
+                  <a:ext cx="860235" cy="276999"/>
+                </a:xfrm>
+                <a:prstGeom prst="rect">
+                  <a:avLst/>
+                </a:prstGeom>
+                <a:solidFill>
+                  <a:schemeClr val="accent6">
+                    <a:lumMod val="75000"/>
+                  </a:schemeClr>
+                </a:solidFill>
+                <a:ln w="19050">
+                  <a:solidFill>
+                    <a:schemeClr val="tx2">
+                      <a:lumMod val="60000"/>
+                      <a:lumOff val="40000"/>
+                    </a:schemeClr>
+                  </a:solidFill>
+                  <a:headEnd type="none" w="med" len="med"/>
+                  <a:tailEnd type="triangle" w="med" len="med"/>
+                </a:ln>
+              </p:spPr>
+              <p:txBody>
+                <a:bodyPr wrap="none" rtlCol="0">
+                  <a:spAutoFit/>
+                </a:bodyPr>
+                <a:lstStyle/>
+                <a:p>
+                  <a:pPr algn="ctr"/>
+                  <a:r>
+                    <a:rPr lang="en-US" sz="1200" dirty="0" smtClean="0">
+                      <a:solidFill>
+                        <a:schemeClr val="bg1"/>
+                      </a:solidFill>
+                    </a:rPr>
+                    <a:t>continuant</a:t>
+                  </a:r>
+                </a:p>
+              </p:txBody>
+            </p:sp>
+            <p:sp>
+              <p:nvSpPr>
+                <p:cNvPr id="12" name="TextBox 11"/>
+                <p:cNvSpPr txBox="1"/>
+                <p:nvPr/>
+              </p:nvSpPr>
+              <p:spPr>
+                <a:xfrm>
+                  <a:off x="1044765" y="5523298"/>
+                  <a:ext cx="860235" cy="276999"/>
+                </a:xfrm>
+                <a:prstGeom prst="rect">
+                  <a:avLst/>
+                </a:prstGeom>
+                <a:solidFill>
+                  <a:schemeClr val="accent6">
+                    <a:lumMod val="75000"/>
+                  </a:schemeClr>
+                </a:solidFill>
+                <a:ln w="19050">
+                  <a:solidFill>
+                    <a:schemeClr val="tx2">
+                      <a:lumMod val="60000"/>
+                      <a:lumOff val="40000"/>
+                    </a:schemeClr>
+                  </a:solidFill>
+                  <a:headEnd type="none" w="med" len="med"/>
+                  <a:tailEnd type="triangle" w="med" len="med"/>
+                </a:ln>
+              </p:spPr>
+              <p:txBody>
+                <a:bodyPr wrap="square" rtlCol="0">
+                  <a:spAutoFit/>
+                </a:bodyPr>
+                <a:lstStyle/>
+                <a:p>
+                  <a:pPr algn="ctr"/>
+                  <a:r>
+                    <a:rPr lang="en-US" sz="1200" dirty="0" err="1" smtClean="0">
+                      <a:solidFill>
+                        <a:schemeClr val="bg1"/>
+                      </a:solidFill>
+                    </a:rPr>
+                    <a:t>occurrent</a:t>
+                  </a:r>
+                  <a:endParaRPr lang="en-US" sz="1200" dirty="0" smtClean="0">
+                    <a:solidFill>
+                      <a:schemeClr val="bg1"/>
+                    </a:solidFill>
+                  </a:endParaRPr>
+                </a:p>
+              </p:txBody>
+            </p:sp>
+            <p:sp>
+              <p:nvSpPr>
+                <p:cNvPr id="13" name="TextBox 12"/>
+                <p:cNvSpPr txBox="1"/>
+                <p:nvPr/>
+              </p:nvSpPr>
+              <p:spPr>
+                <a:xfrm>
+                  <a:off x="3317696" y="1670465"/>
+                  <a:ext cx="1101904" cy="461665"/>
+                </a:xfrm>
+                <a:prstGeom prst="rect">
+                  <a:avLst/>
+                </a:prstGeom>
+                <a:solidFill>
+                  <a:srgbClr val="7030A0"/>
+                </a:solidFill>
+                <a:ln w="19050">
+                  <a:solidFill>
+                    <a:schemeClr val="tx2">
+                      <a:lumMod val="60000"/>
+                      <a:lumOff val="40000"/>
+                    </a:schemeClr>
+                  </a:solidFill>
+                  <a:headEnd type="none" w="med" len="med"/>
+                  <a:tailEnd type="triangle" w="med" len="med"/>
+                </a:ln>
+              </p:spPr>
+              <p:txBody>
+                <a:bodyPr wrap="square" rtlCol="0">
+                  <a:spAutoFit/>
+                </a:bodyPr>
+                <a:lstStyle/>
+                <a:p>
+                  <a:pPr algn="ctr"/>
+                  <a:r>
+                    <a:rPr lang="en-US" sz="1200" dirty="0">
+                      <a:solidFill>
+                        <a:schemeClr val="bg1"/>
+                      </a:solidFill>
+                    </a:rPr>
+                    <a:t>i</a:t>
+                  </a:r>
+                  <a:r>
+                    <a:rPr lang="en-US" sz="1200" dirty="0" smtClean="0">
+                      <a:solidFill>
+                        <a:schemeClr val="bg1"/>
+                      </a:solidFill>
+                    </a:rPr>
+                    <a:t>nformation </a:t>
+                  </a:r>
+                </a:p>
+                <a:p>
+                  <a:pPr algn="ctr"/>
+                  <a:r>
+                    <a:rPr lang="en-US" sz="1200" dirty="0">
+                      <a:solidFill>
+                        <a:schemeClr val="bg1"/>
+                      </a:solidFill>
+                    </a:rPr>
+                    <a:t>c</a:t>
+                  </a:r>
+                  <a:r>
+                    <a:rPr lang="en-US" sz="1200" dirty="0" smtClean="0">
+                      <a:solidFill>
+                        <a:schemeClr val="bg1"/>
+                      </a:solidFill>
+                    </a:rPr>
+                    <a:t>ontent entity</a:t>
+                  </a:r>
+                </a:p>
+              </p:txBody>
+            </p:sp>
+            <p:sp>
+              <p:nvSpPr>
+                <p:cNvPr id="14" name="TextBox 13"/>
+                <p:cNvSpPr txBox="1"/>
+                <p:nvPr/>
+              </p:nvSpPr>
+              <p:spPr>
+                <a:xfrm>
+                  <a:off x="3317696" y="5105307"/>
+                  <a:ext cx="1101904" cy="461665"/>
+                </a:xfrm>
+                <a:prstGeom prst="rect">
+                  <a:avLst/>
+                </a:prstGeom>
+                <a:solidFill>
+                  <a:schemeClr val="accent1">
+                    <a:lumMod val="75000"/>
+                  </a:schemeClr>
+                </a:solidFill>
+                <a:ln w="19050">
+                  <a:solidFill>
+                    <a:schemeClr val="tx2">
+                      <a:lumMod val="60000"/>
+                      <a:lumOff val="40000"/>
+                    </a:schemeClr>
+                  </a:solidFill>
+                  <a:headEnd type="none" w="med" len="med"/>
+                  <a:tailEnd type="triangle" w="med" len="med"/>
+                </a:ln>
+              </p:spPr>
+              <p:txBody>
+                <a:bodyPr wrap="square" rtlCol="0">
+                  <a:spAutoFit/>
+                </a:bodyPr>
+                <a:lstStyle/>
+                <a:p>
+                  <a:pPr algn="ctr"/>
+                  <a:r>
+                    <a:rPr lang="en-US" sz="1200" dirty="0" smtClean="0">
+                      <a:solidFill>
+                        <a:schemeClr val="bg1"/>
+                      </a:solidFill>
+                    </a:rPr>
+                    <a:t>planned</a:t>
+                  </a:r>
+                </a:p>
+                <a:p>
+                  <a:pPr algn="ctr"/>
+                  <a:r>
+                    <a:rPr lang="en-US" sz="1200" dirty="0" smtClean="0">
+                      <a:solidFill>
+                        <a:schemeClr val="bg1"/>
+                      </a:solidFill>
+                    </a:rPr>
+                    <a:t>process</a:t>
+                  </a:r>
+                </a:p>
+              </p:txBody>
+            </p:sp>
+            <p:sp>
+              <p:nvSpPr>
+                <p:cNvPr id="15" name="TextBox 14"/>
+                <p:cNvSpPr txBox="1"/>
+                <p:nvPr/>
+              </p:nvSpPr>
+              <p:spPr>
+                <a:xfrm>
+                  <a:off x="4753255" y="1295400"/>
+                  <a:ext cx="780855" cy="276999"/>
+                </a:xfrm>
+                <a:prstGeom prst="rect">
+                  <a:avLst/>
+                </a:prstGeom>
+                <a:solidFill>
+                  <a:srgbClr val="7030A0"/>
+                </a:solidFill>
+                <a:ln w="19050">
+                  <a:solidFill>
+                    <a:schemeClr val="tx2">
+                      <a:lumMod val="60000"/>
+                      <a:lumOff val="40000"/>
+                    </a:schemeClr>
+                  </a:solidFill>
+                  <a:headEnd type="none" w="med" len="med"/>
+                  <a:tailEnd type="triangle" w="med" len="med"/>
+                </a:ln>
+              </p:spPr>
+              <p:txBody>
+                <a:bodyPr wrap="none" rtlCol="0">
+                  <a:spAutoFit/>
+                </a:bodyPr>
+                <a:lstStyle/>
+                <a:p>
+                  <a:pPr algn="ctr"/>
+                  <a:r>
+                    <a:rPr lang="en-US" sz="1200" dirty="0">
+                      <a:solidFill>
+                        <a:schemeClr val="bg1"/>
+                      </a:solidFill>
+                    </a:rPr>
+                    <a:t>d</a:t>
+                  </a:r>
+                  <a:r>
+                    <a:rPr lang="en-US" sz="1200" dirty="0" smtClean="0">
+                      <a:solidFill>
+                        <a:schemeClr val="bg1"/>
+                      </a:solidFill>
+                    </a:rPr>
+                    <a:t>ata item</a:t>
+                  </a:r>
+                  <a:endParaRPr lang="en-US" sz="1200" dirty="0">
+                    <a:solidFill>
+                      <a:schemeClr val="bg1"/>
+                    </a:solidFill>
+                  </a:endParaRPr>
+                </a:p>
+              </p:txBody>
+            </p:sp>
+            <p:sp>
+              <p:nvSpPr>
+                <p:cNvPr id="16" name="TextBox 15"/>
+                <p:cNvSpPr txBox="1"/>
+                <p:nvPr/>
+              </p:nvSpPr>
+              <p:spPr>
+                <a:xfrm>
+                  <a:off x="4758802" y="4534040"/>
+                  <a:ext cx="1005661" cy="276999"/>
+                </a:xfrm>
+                <a:prstGeom prst="rect">
+                  <a:avLst/>
+                </a:prstGeom>
+                <a:solidFill>
+                  <a:schemeClr val="accent1">
+                    <a:lumMod val="75000"/>
+                  </a:schemeClr>
+                </a:solidFill>
+                <a:ln w="19050">
+                  <a:solidFill>
+                    <a:schemeClr val="tx2">
+                      <a:lumMod val="60000"/>
+                      <a:lumOff val="40000"/>
+                    </a:schemeClr>
+                  </a:solidFill>
+                  <a:headEnd type="none" w="med" len="med"/>
+                  <a:tailEnd type="triangle" w="med" len="med"/>
+                </a:ln>
+              </p:spPr>
+              <p:txBody>
+                <a:bodyPr wrap="none" rtlCol="0">
+                  <a:spAutoFit/>
+                </a:bodyPr>
+                <a:lstStyle/>
+                <a:p>
+                  <a:pPr algn="ctr"/>
+                  <a:r>
+                    <a:rPr lang="en-US" sz="1200" dirty="0" smtClean="0">
+                      <a:solidFill>
+                        <a:schemeClr val="bg1"/>
+                      </a:solidFill>
+                    </a:rPr>
+                    <a:t>investigation</a:t>
+                  </a:r>
+                  <a:endParaRPr lang="en-US" sz="1200" dirty="0">
+                    <a:solidFill>
+                      <a:schemeClr val="bg1"/>
+                    </a:solidFill>
+                  </a:endParaRPr>
+                </a:p>
+              </p:txBody>
+            </p:sp>
+            <p:sp>
+              <p:nvSpPr>
+                <p:cNvPr id="17" name="TextBox 16"/>
+                <p:cNvSpPr txBox="1"/>
+                <p:nvPr/>
+              </p:nvSpPr>
+              <p:spPr>
+                <a:xfrm>
+                  <a:off x="4758802" y="4838840"/>
+                  <a:ext cx="1432187" cy="276999"/>
+                </a:xfrm>
+                <a:prstGeom prst="rect">
+                  <a:avLst/>
+                </a:prstGeom>
+                <a:solidFill>
+                  <a:schemeClr val="accent1">
+                    <a:lumMod val="75000"/>
+                  </a:schemeClr>
+                </a:solidFill>
+                <a:ln w="19050">
+                  <a:solidFill>
+                    <a:schemeClr val="tx2">
+                      <a:lumMod val="60000"/>
+                      <a:lumOff val="40000"/>
+                    </a:schemeClr>
+                  </a:solidFill>
+                  <a:headEnd type="none" w="med" len="med"/>
+                  <a:tailEnd type="triangle" w="med" len="med"/>
+                </a:ln>
+              </p:spPr>
+              <p:txBody>
+                <a:bodyPr wrap="square" rtlCol="0">
+                  <a:spAutoFit/>
+                </a:bodyPr>
+                <a:lstStyle/>
+                <a:p>
+                  <a:pPr algn="ctr"/>
+                  <a:r>
+                    <a:rPr lang="en-US" sz="1200" dirty="0" smtClean="0">
+                      <a:solidFill>
+                        <a:schemeClr val="bg1"/>
+                      </a:solidFill>
+                    </a:rPr>
+                    <a:t>specimen collection</a:t>
+                  </a:r>
+                  <a:endParaRPr lang="en-US" sz="1200" dirty="0">
+                    <a:solidFill>
+                      <a:schemeClr val="bg1"/>
+                    </a:solidFill>
+                  </a:endParaRPr>
+                </a:p>
+              </p:txBody>
+            </p:sp>
+            <p:sp>
+              <p:nvSpPr>
+                <p:cNvPr id="18" name="TextBox 17"/>
+                <p:cNvSpPr txBox="1"/>
+                <p:nvPr/>
+              </p:nvSpPr>
+              <p:spPr>
+                <a:xfrm>
+                  <a:off x="6619967" y="5492576"/>
+                  <a:ext cx="1458091" cy="461665"/>
+                </a:xfrm>
+                <a:prstGeom prst="rect">
+                  <a:avLst/>
+                </a:prstGeom>
+                <a:solidFill>
+                  <a:schemeClr val="accent1">
+                    <a:lumMod val="75000"/>
+                  </a:schemeClr>
+                </a:solidFill>
+                <a:ln w="19050">
+                  <a:solidFill>
+                    <a:schemeClr val="tx2">
+                      <a:lumMod val="60000"/>
+                      <a:lumOff val="40000"/>
+                    </a:schemeClr>
+                  </a:solidFill>
+                  <a:headEnd type="none" w="med" len="med"/>
+                  <a:tailEnd type="triangle" w="med" len="med"/>
+                </a:ln>
+              </p:spPr>
+              <p:txBody>
+                <a:bodyPr wrap="none" rtlCol="0">
+                  <a:spAutoFit/>
+                </a:bodyPr>
+                <a:lstStyle/>
+                <a:p>
+                  <a:pPr algn="ctr"/>
+                  <a:r>
+                    <a:rPr lang="en-US" sz="1200" dirty="0" smtClean="0">
+                      <a:solidFill>
+                        <a:schemeClr val="bg1"/>
+                      </a:solidFill>
+                    </a:rPr>
+                    <a:t>material component</a:t>
+                  </a:r>
+                </a:p>
+                <a:p>
+                  <a:pPr algn="ctr"/>
+                  <a:r>
+                    <a:rPr lang="en-US" sz="1200" dirty="0" smtClean="0">
+                      <a:solidFill>
+                        <a:schemeClr val="bg1"/>
+                      </a:solidFill>
+                    </a:rPr>
+                    <a:t>separation</a:t>
+                  </a:r>
+                  <a:endParaRPr lang="en-US" sz="1200" dirty="0">
+                    <a:solidFill>
+                      <a:schemeClr val="bg1"/>
+                    </a:solidFill>
+                  </a:endParaRPr>
+                </a:p>
+              </p:txBody>
+            </p:sp>
+            <p:sp>
+              <p:nvSpPr>
+                <p:cNvPr id="19" name="TextBox 18"/>
+                <p:cNvSpPr txBox="1"/>
+                <p:nvPr/>
+              </p:nvSpPr>
+              <p:spPr>
+                <a:xfrm>
+                  <a:off x="4753255" y="2211509"/>
+                  <a:ext cx="1275222" cy="276999"/>
+                </a:xfrm>
+                <a:prstGeom prst="rect">
+                  <a:avLst/>
+                </a:prstGeom>
+                <a:solidFill>
+                  <a:srgbClr val="7030A0"/>
+                </a:solidFill>
+                <a:ln w="19050">
+                  <a:solidFill>
+                    <a:schemeClr val="tx2">
+                      <a:lumMod val="60000"/>
+                      <a:lumOff val="40000"/>
+                    </a:schemeClr>
+                  </a:solidFill>
+                  <a:headEnd type="none" w="med" len="med"/>
+                  <a:tailEnd type="triangle" w="med" len="med"/>
+                </a:ln>
+              </p:spPr>
+              <p:txBody>
+                <a:bodyPr wrap="none" rtlCol="0">
+                  <a:spAutoFit/>
+                </a:bodyPr>
+                <a:lstStyle/>
+                <a:p>
+                  <a:pPr algn="ctr"/>
+                  <a:r>
+                    <a:rPr lang="en-US" sz="1200" dirty="0" smtClean="0">
+                      <a:solidFill>
+                        <a:schemeClr val="bg1"/>
+                      </a:solidFill>
+                    </a:rPr>
+                    <a:t>plan specification</a:t>
+                  </a:r>
+                </a:p>
+              </p:txBody>
+            </p:sp>
+            <p:sp>
+              <p:nvSpPr>
+                <p:cNvPr id="20" name="TextBox 19"/>
+                <p:cNvSpPr txBox="1"/>
+                <p:nvPr/>
+              </p:nvSpPr>
+              <p:spPr>
+                <a:xfrm>
+                  <a:off x="6619967" y="5176935"/>
+                  <a:ext cx="1533433" cy="276999"/>
+                </a:xfrm>
+                <a:prstGeom prst="rect">
+                  <a:avLst/>
+                </a:prstGeom>
+                <a:solidFill>
+                  <a:schemeClr val="accent1">
+                    <a:lumMod val="75000"/>
+                  </a:schemeClr>
+                </a:solidFill>
+                <a:ln w="19050">
+                  <a:solidFill>
+                    <a:schemeClr val="tx2">
+                      <a:lumMod val="60000"/>
+                      <a:lumOff val="40000"/>
+                    </a:schemeClr>
+                  </a:solidFill>
+                  <a:headEnd type="none" w="med" len="med"/>
+                  <a:tailEnd type="triangle" w="med" len="med"/>
+                </a:ln>
+              </p:spPr>
+              <p:txBody>
+                <a:bodyPr wrap="none" rtlCol="0">
+                  <a:spAutoFit/>
+                </a:bodyPr>
+                <a:lstStyle/>
+                <a:p>
+                  <a:pPr algn="ctr"/>
+                  <a:r>
+                    <a:rPr lang="en-US" sz="1200" dirty="0" smtClean="0">
+                      <a:solidFill>
+                        <a:schemeClr val="bg1"/>
+                      </a:solidFill>
+                    </a:rPr>
+                    <a:t>material combination</a:t>
+                  </a:r>
+                  <a:endParaRPr lang="en-US" sz="1200" dirty="0">
+                    <a:solidFill>
+                      <a:schemeClr val="bg1"/>
+                    </a:solidFill>
+                  </a:endParaRPr>
+                </a:p>
+              </p:txBody>
+            </p:sp>
+            <p:sp>
+              <p:nvSpPr>
+                <p:cNvPr id="21" name="TextBox 20"/>
+                <p:cNvSpPr txBox="1"/>
+                <p:nvPr/>
+              </p:nvSpPr>
+              <p:spPr>
+                <a:xfrm>
+                  <a:off x="4758802" y="5753240"/>
+                  <a:ext cx="526554" cy="276999"/>
+                </a:xfrm>
+                <a:prstGeom prst="rect">
+                  <a:avLst/>
+                </a:prstGeom>
+                <a:solidFill>
+                  <a:schemeClr val="accent1">
+                    <a:lumMod val="75000"/>
+                  </a:schemeClr>
+                </a:solidFill>
+                <a:ln w="19050">
+                  <a:solidFill>
+                    <a:schemeClr val="tx2">
+                      <a:lumMod val="60000"/>
+                      <a:lumOff val="40000"/>
+                    </a:schemeClr>
+                  </a:solidFill>
+                  <a:headEnd type="none" w="med" len="med"/>
+                  <a:tailEnd type="triangle" w="med" len="med"/>
+                </a:ln>
+              </p:spPr>
+              <p:txBody>
+                <a:bodyPr wrap="none" rtlCol="0">
+                  <a:spAutoFit/>
+                </a:bodyPr>
+                <a:lstStyle/>
+                <a:p>
+                  <a:pPr algn="ctr"/>
+                  <a:r>
+                    <a:rPr lang="en-US" sz="1200" dirty="0" smtClean="0">
+                      <a:solidFill>
+                        <a:schemeClr val="bg1"/>
+                      </a:solidFill>
+                    </a:rPr>
+                    <a:t>assay</a:t>
+                  </a:r>
+                  <a:endParaRPr lang="en-US" sz="1200" dirty="0">
+                    <a:solidFill>
+                      <a:schemeClr val="bg1"/>
+                    </a:solidFill>
+                  </a:endParaRPr>
+                </a:p>
+              </p:txBody>
+            </p:sp>
+            <p:sp>
+              <p:nvSpPr>
+                <p:cNvPr id="22" name="TextBox 21"/>
+                <p:cNvSpPr txBox="1"/>
+                <p:nvPr/>
+              </p:nvSpPr>
+              <p:spPr>
+                <a:xfrm>
+                  <a:off x="4753255" y="1600200"/>
+                  <a:ext cx="822854" cy="276999"/>
+                </a:xfrm>
+                <a:prstGeom prst="rect">
+                  <a:avLst/>
+                </a:prstGeom>
+                <a:solidFill>
+                  <a:srgbClr val="7030A0"/>
+                </a:solidFill>
+                <a:ln w="19050">
+                  <a:solidFill>
+                    <a:schemeClr val="tx2">
+                      <a:lumMod val="60000"/>
+                      <a:lumOff val="40000"/>
+                    </a:schemeClr>
+                  </a:solidFill>
+                  <a:headEnd type="none" w="med" len="med"/>
+                  <a:tailEnd type="triangle" w="med" len="med"/>
+                </a:ln>
+              </p:spPr>
+              <p:txBody>
+                <a:bodyPr wrap="none" rtlCol="0">
+                  <a:spAutoFit/>
+                </a:bodyPr>
+                <a:lstStyle/>
+                <a:p>
+                  <a:r>
+                    <a:rPr lang="en-US" sz="1200" dirty="0" smtClean="0">
+                      <a:solidFill>
+                        <a:schemeClr val="bg1"/>
+                      </a:solidFill>
+                    </a:rPr>
+                    <a:t>document</a:t>
+                  </a:r>
+                </a:p>
+              </p:txBody>
+            </p:sp>
+            <p:sp>
+              <p:nvSpPr>
+                <p:cNvPr id="23" name="TextBox 22"/>
+                <p:cNvSpPr txBox="1"/>
+                <p:nvPr/>
+              </p:nvSpPr>
+              <p:spPr>
+                <a:xfrm>
+                  <a:off x="4753255" y="1901298"/>
+                  <a:ext cx="1014893" cy="276999"/>
+                </a:xfrm>
+                <a:prstGeom prst="rect">
+                  <a:avLst/>
+                </a:prstGeom>
+                <a:solidFill>
+                  <a:srgbClr val="7030A0"/>
+                </a:solidFill>
+                <a:ln w="19050">
+                  <a:solidFill>
+                    <a:schemeClr val="tx2">
+                      <a:lumMod val="60000"/>
+                      <a:lumOff val="40000"/>
+                    </a:schemeClr>
+                  </a:solidFill>
+                  <a:headEnd type="none" w="med" len="med"/>
+                  <a:tailEnd type="triangle" w="med" len="med"/>
+                </a:ln>
+              </p:spPr>
+              <p:txBody>
+                <a:bodyPr wrap="none" rtlCol="0">
+                  <a:spAutoFit/>
+                </a:bodyPr>
+                <a:lstStyle/>
+                <a:p>
+                  <a:pPr algn="ctr"/>
+                  <a:r>
+                    <a:rPr lang="en-US" sz="1200" dirty="0">
+                      <a:solidFill>
+                        <a:schemeClr val="bg1"/>
+                      </a:solidFill>
+                    </a:rPr>
+                    <a:t>t</a:t>
+                  </a:r>
+                  <a:r>
+                    <a:rPr lang="en-US" sz="1200" dirty="0" smtClean="0">
+                      <a:solidFill>
+                        <a:schemeClr val="bg1"/>
+                      </a:solidFill>
+                    </a:rPr>
+                    <a:t>extual entity</a:t>
+                  </a:r>
+                  <a:endParaRPr lang="en-US" sz="1200" dirty="0">
+                    <a:solidFill>
+                      <a:schemeClr val="bg1"/>
+                    </a:solidFill>
+                  </a:endParaRPr>
+                </a:p>
+              </p:txBody>
+            </p:sp>
+            <p:cxnSp>
+              <p:nvCxnSpPr>
+                <p:cNvPr id="24" name="Straight Arrow Connector 23"/>
+                <p:cNvCxnSpPr>
+                  <a:stCxn id="11" idx="1"/>
+                  <a:endCxn id="10" idx="3"/>
+                </p:cNvCxnSpPr>
+                <p:nvPr/>
+              </p:nvCxnSpPr>
+              <p:spPr>
+                <a:xfrm flipH="1">
+                  <a:off x="762000" y="2729207"/>
+                  <a:ext cx="282765" cy="1236151"/>
+                </a:xfrm>
+                <a:prstGeom prst="straightConnector1">
+                  <a:avLst/>
+                </a:prstGeom>
+                <a:ln w="19050">
+                  <a:solidFill>
+                    <a:schemeClr val="tx2">
+                      <a:lumMod val="60000"/>
+                      <a:lumOff val="40000"/>
+                    </a:schemeClr>
+                  </a:solidFill>
+                  <a:headEnd type="none" w="med" len="med"/>
+                  <a:tailEnd type="triangle" w="med" len="med"/>
+                </a:ln>
+              </p:spPr>
+              <p:style>
+                <a:lnRef idx="1">
+                  <a:schemeClr val="accent1"/>
+                </a:lnRef>
+                <a:fillRef idx="0">
+                  <a:schemeClr val="accent1"/>
+                </a:fillRef>
+                <a:effectRef idx="0">
+                  <a:schemeClr val="accent1"/>
+                </a:effectRef>
+                <a:fontRef idx="minor">
+                  <a:schemeClr val="tx1"/>
+                </a:fontRef>
+              </p:style>
+            </p:cxnSp>
+            <p:cxnSp>
+              <p:nvCxnSpPr>
+                <p:cNvPr id="25" name="Straight Arrow Connector 24"/>
+                <p:cNvCxnSpPr>
+                  <a:stCxn id="12" idx="1"/>
+                  <a:endCxn id="10" idx="3"/>
+                </p:cNvCxnSpPr>
+                <p:nvPr/>
+              </p:nvCxnSpPr>
+              <p:spPr>
+                <a:xfrm flipH="1" flipV="1">
+                  <a:off x="762000" y="3965358"/>
+                  <a:ext cx="282765" cy="1696440"/>
+                </a:xfrm>
+                <a:prstGeom prst="straightConnector1">
+                  <a:avLst/>
+                </a:prstGeom>
+                <a:ln w="19050">
+                  <a:solidFill>
+                    <a:schemeClr val="tx2">
+                      <a:lumMod val="60000"/>
+                      <a:lumOff val="40000"/>
+                    </a:schemeClr>
+                  </a:solidFill>
+                  <a:headEnd type="none" w="med" len="med"/>
+                  <a:tailEnd type="triangle" w="med" len="med"/>
+                </a:ln>
+              </p:spPr>
+              <p:style>
+                <a:lnRef idx="1">
+                  <a:schemeClr val="accent1"/>
+                </a:lnRef>
+                <a:fillRef idx="0">
+                  <a:schemeClr val="accent1"/>
+                </a:fillRef>
+                <a:effectRef idx="0">
+                  <a:schemeClr val="accent1"/>
+                </a:effectRef>
+                <a:fontRef idx="minor">
+                  <a:schemeClr val="tx1"/>
+                </a:fontRef>
+              </p:style>
+            </p:cxnSp>
+            <p:cxnSp>
+              <p:nvCxnSpPr>
+                <p:cNvPr id="26" name="Straight Arrow Connector 25"/>
+                <p:cNvCxnSpPr>
+                  <a:stCxn id="14" idx="1"/>
+                  <a:endCxn id="65" idx="3"/>
+                </p:cNvCxnSpPr>
+                <p:nvPr/>
+              </p:nvCxnSpPr>
+              <p:spPr>
+                <a:xfrm flipH="1">
+                  <a:off x="3124200" y="5336140"/>
+                  <a:ext cx="193496" cy="325658"/>
+                </a:xfrm>
+                <a:prstGeom prst="straightConnector1">
+                  <a:avLst/>
+                </a:prstGeom>
+                <a:ln w="19050">
+                  <a:solidFill>
+                    <a:schemeClr val="tx2">
+                      <a:lumMod val="60000"/>
+                      <a:lumOff val="40000"/>
+                    </a:schemeClr>
+                  </a:solidFill>
+                  <a:headEnd type="none" w="med" len="med"/>
+                  <a:tailEnd type="triangle" w="med" len="med"/>
+                </a:ln>
+              </p:spPr>
+              <p:style>
+                <a:lnRef idx="1">
+                  <a:schemeClr val="accent1"/>
+                </a:lnRef>
+                <a:fillRef idx="0">
+                  <a:schemeClr val="accent1"/>
+                </a:fillRef>
+                <a:effectRef idx="0">
+                  <a:schemeClr val="accent1"/>
+                </a:effectRef>
+                <a:fontRef idx="minor">
+                  <a:schemeClr val="tx1"/>
+                </a:fontRef>
+              </p:style>
+            </p:cxnSp>
+            <p:cxnSp>
+              <p:nvCxnSpPr>
+                <p:cNvPr id="27" name="Straight Arrow Connector 26"/>
+                <p:cNvCxnSpPr>
+                  <a:endCxn id="69" idx="3"/>
+                </p:cNvCxnSpPr>
+                <p:nvPr/>
+              </p:nvCxnSpPr>
+              <p:spPr>
+                <a:xfrm flipH="1">
+                  <a:off x="3124200" y="1901297"/>
+                  <a:ext cx="193496" cy="1"/>
+                </a:xfrm>
+                <a:prstGeom prst="straightConnector1">
+                  <a:avLst/>
+                </a:prstGeom>
+                <a:ln w="19050">
+                  <a:solidFill>
+                    <a:schemeClr val="tx2">
+                      <a:lumMod val="60000"/>
+                      <a:lumOff val="40000"/>
+                    </a:schemeClr>
+                  </a:solidFill>
+                  <a:headEnd type="none" w="med" len="med"/>
+                  <a:tailEnd type="triangle" w="med" len="med"/>
+                </a:ln>
+              </p:spPr>
+              <p:style>
+                <a:lnRef idx="1">
+                  <a:schemeClr val="accent1"/>
+                </a:lnRef>
+                <a:fillRef idx="0">
+                  <a:schemeClr val="accent1"/>
+                </a:fillRef>
+                <a:effectRef idx="0">
+                  <a:schemeClr val="accent1"/>
+                </a:effectRef>
+                <a:fontRef idx="minor">
+                  <a:schemeClr val="tx1"/>
+                </a:fontRef>
+              </p:style>
+            </p:cxnSp>
+            <p:cxnSp>
+              <p:nvCxnSpPr>
+                <p:cNvPr id="28" name="Straight Arrow Connector 27"/>
+                <p:cNvCxnSpPr>
+                  <a:stCxn id="15" idx="1"/>
+                  <a:endCxn id="13" idx="3"/>
+                </p:cNvCxnSpPr>
+                <p:nvPr/>
+              </p:nvCxnSpPr>
+              <p:spPr>
+                <a:xfrm flipH="1">
+                  <a:off x="4419600" y="1433900"/>
+                  <a:ext cx="333655" cy="467398"/>
+                </a:xfrm>
+                <a:prstGeom prst="straightConnector1">
+                  <a:avLst/>
+                </a:prstGeom>
+                <a:ln w="19050">
+                  <a:solidFill>
+                    <a:schemeClr val="tx2">
+                      <a:lumMod val="60000"/>
+                      <a:lumOff val="40000"/>
+                    </a:schemeClr>
+                  </a:solidFill>
+                  <a:headEnd type="none" w="med" len="med"/>
+                  <a:tailEnd type="triangle" w="med" len="med"/>
+                </a:ln>
+              </p:spPr>
+              <p:style>
+                <a:lnRef idx="1">
+                  <a:schemeClr val="accent1"/>
+                </a:lnRef>
+                <a:fillRef idx="0">
+                  <a:schemeClr val="accent1"/>
+                </a:fillRef>
+                <a:effectRef idx="0">
+                  <a:schemeClr val="accent1"/>
+                </a:effectRef>
+                <a:fontRef idx="minor">
+                  <a:schemeClr val="tx1"/>
+                </a:fontRef>
+              </p:style>
+            </p:cxnSp>
+            <p:cxnSp>
+              <p:nvCxnSpPr>
+                <p:cNvPr id="29" name="Straight Arrow Connector 28"/>
+                <p:cNvCxnSpPr>
+                  <a:stCxn id="19" idx="1"/>
+                  <a:endCxn id="13" idx="3"/>
+                </p:cNvCxnSpPr>
+                <p:nvPr/>
+              </p:nvCxnSpPr>
+              <p:spPr>
+                <a:xfrm flipH="1" flipV="1">
+                  <a:off x="4419600" y="1901298"/>
+                  <a:ext cx="333655" cy="448711"/>
+                </a:xfrm>
+                <a:prstGeom prst="straightConnector1">
+                  <a:avLst/>
+                </a:prstGeom>
+                <a:ln w="19050">
+                  <a:solidFill>
+                    <a:schemeClr val="tx2">
+                      <a:lumMod val="60000"/>
+                      <a:lumOff val="40000"/>
+                    </a:schemeClr>
+                  </a:solidFill>
+                  <a:headEnd type="none" w="med" len="med"/>
+                  <a:tailEnd type="triangle" w="med" len="med"/>
+                </a:ln>
+              </p:spPr>
+              <p:style>
+                <a:lnRef idx="1">
+                  <a:schemeClr val="accent1"/>
+                </a:lnRef>
+                <a:fillRef idx="0">
+                  <a:schemeClr val="accent1"/>
+                </a:fillRef>
+                <a:effectRef idx="0">
+                  <a:schemeClr val="accent1"/>
+                </a:effectRef>
+                <a:fontRef idx="minor">
+                  <a:schemeClr val="tx1"/>
+                </a:fontRef>
+              </p:style>
+            </p:cxnSp>
+            <p:cxnSp>
+              <p:nvCxnSpPr>
+                <p:cNvPr id="30" name="Straight Arrow Connector 29"/>
+                <p:cNvCxnSpPr>
+                  <a:stCxn id="22" idx="1"/>
+                  <a:endCxn id="13" idx="3"/>
+                </p:cNvCxnSpPr>
+                <p:nvPr/>
+              </p:nvCxnSpPr>
+              <p:spPr>
+                <a:xfrm flipH="1">
+                  <a:off x="4419600" y="1738700"/>
+                  <a:ext cx="333655" cy="162598"/>
+                </a:xfrm>
+                <a:prstGeom prst="straightConnector1">
+                  <a:avLst/>
+                </a:prstGeom>
+                <a:ln w="19050">
+                  <a:solidFill>
+                    <a:schemeClr val="tx2">
+                      <a:lumMod val="60000"/>
+                      <a:lumOff val="40000"/>
+                    </a:schemeClr>
+                  </a:solidFill>
+                  <a:headEnd type="none" w="med" len="med"/>
+                  <a:tailEnd type="triangle" w="med" len="med"/>
+                </a:ln>
+              </p:spPr>
+              <p:style>
+                <a:lnRef idx="1">
+                  <a:schemeClr val="accent1"/>
+                </a:lnRef>
+                <a:fillRef idx="0">
+                  <a:schemeClr val="accent1"/>
+                </a:fillRef>
+                <a:effectRef idx="0">
+                  <a:schemeClr val="accent1"/>
+                </a:effectRef>
+                <a:fontRef idx="minor">
+                  <a:schemeClr val="tx1"/>
+                </a:fontRef>
+              </p:style>
+            </p:cxnSp>
+            <p:cxnSp>
+              <p:nvCxnSpPr>
+                <p:cNvPr id="31" name="Straight Arrow Connector 30"/>
+                <p:cNvCxnSpPr>
+                  <a:stCxn id="16" idx="1"/>
+                  <a:endCxn id="14" idx="3"/>
+                </p:cNvCxnSpPr>
+                <p:nvPr/>
+              </p:nvCxnSpPr>
+              <p:spPr>
+                <a:xfrm flipH="1">
+                  <a:off x="4419600" y="4672540"/>
+                  <a:ext cx="339202" cy="663600"/>
+                </a:xfrm>
+                <a:prstGeom prst="straightConnector1">
+                  <a:avLst/>
+                </a:prstGeom>
+                <a:ln w="19050">
+                  <a:solidFill>
+                    <a:schemeClr val="tx2">
+                      <a:lumMod val="60000"/>
+                      <a:lumOff val="40000"/>
+                    </a:schemeClr>
+                  </a:solidFill>
+                  <a:headEnd type="none" w="med" len="med"/>
+                  <a:tailEnd type="triangle" w="med" len="med"/>
+                </a:ln>
+              </p:spPr>
+              <p:style>
+                <a:lnRef idx="1">
+                  <a:schemeClr val="accent1"/>
+                </a:lnRef>
+                <a:fillRef idx="0">
+                  <a:schemeClr val="accent1"/>
+                </a:fillRef>
+                <a:effectRef idx="0">
+                  <a:schemeClr val="accent1"/>
+                </a:effectRef>
+                <a:fontRef idx="minor">
+                  <a:schemeClr val="tx1"/>
+                </a:fontRef>
+              </p:style>
+            </p:cxnSp>
+            <p:cxnSp>
+              <p:nvCxnSpPr>
+                <p:cNvPr id="32" name="Straight Arrow Connector 31"/>
+                <p:cNvCxnSpPr>
+                  <a:stCxn id="17" idx="1"/>
+                  <a:endCxn id="14" idx="3"/>
+                </p:cNvCxnSpPr>
+                <p:nvPr/>
+              </p:nvCxnSpPr>
+              <p:spPr>
+                <a:xfrm flipH="1">
+                  <a:off x="4419600" y="4977340"/>
+                  <a:ext cx="339202" cy="358800"/>
+                </a:xfrm>
+                <a:prstGeom prst="straightConnector1">
+                  <a:avLst/>
+                </a:prstGeom>
+                <a:ln w="19050">
+                  <a:solidFill>
+                    <a:schemeClr val="tx2">
+                      <a:lumMod val="60000"/>
+                      <a:lumOff val="40000"/>
+                    </a:schemeClr>
+                  </a:solidFill>
+                  <a:headEnd type="none" w="med" len="med"/>
+                  <a:tailEnd type="triangle" w="med" len="med"/>
+                </a:ln>
+              </p:spPr>
+              <p:style>
+                <a:lnRef idx="1">
+                  <a:schemeClr val="accent1"/>
+                </a:lnRef>
+                <a:fillRef idx="0">
+                  <a:schemeClr val="accent1"/>
+                </a:fillRef>
+                <a:effectRef idx="0">
+                  <a:schemeClr val="accent1"/>
+                </a:effectRef>
+                <a:fontRef idx="minor">
+                  <a:schemeClr val="tx1"/>
+                </a:fontRef>
+              </p:style>
+            </p:cxnSp>
+            <p:cxnSp>
+              <p:nvCxnSpPr>
+                <p:cNvPr id="33" name="Straight Arrow Connector 32"/>
+                <p:cNvCxnSpPr>
+                  <a:stCxn id="21" idx="1"/>
+                  <a:endCxn id="14" idx="3"/>
+                </p:cNvCxnSpPr>
+                <p:nvPr/>
+              </p:nvCxnSpPr>
+              <p:spPr>
+                <a:xfrm flipH="1" flipV="1">
+                  <a:off x="4419600" y="5336140"/>
+                  <a:ext cx="339202" cy="555600"/>
+                </a:xfrm>
+                <a:prstGeom prst="straightConnector1">
+                  <a:avLst/>
+                </a:prstGeom>
+                <a:ln w="19050">
+                  <a:solidFill>
+                    <a:schemeClr val="tx2">
+                      <a:lumMod val="60000"/>
+                      <a:lumOff val="40000"/>
+                    </a:schemeClr>
+                  </a:solidFill>
+                  <a:headEnd type="none" w="med" len="med"/>
+                  <a:tailEnd type="triangle" w="med" len="med"/>
+                </a:ln>
+              </p:spPr>
+              <p:style>
+                <a:lnRef idx="1">
+                  <a:schemeClr val="accent1"/>
+                </a:lnRef>
+                <a:fillRef idx="0">
+                  <a:schemeClr val="accent1"/>
+                </a:fillRef>
+                <a:effectRef idx="0">
+                  <a:schemeClr val="accent1"/>
+                </a:effectRef>
+                <a:fontRef idx="minor">
+                  <a:schemeClr val="tx1"/>
+                </a:fontRef>
+              </p:style>
+            </p:cxnSp>
+            <p:cxnSp>
+              <p:nvCxnSpPr>
+                <p:cNvPr id="34" name="Straight Arrow Connector 33"/>
+                <p:cNvCxnSpPr>
+                  <a:stCxn id="23" idx="1"/>
+                  <a:endCxn id="13" idx="3"/>
+                </p:cNvCxnSpPr>
+                <p:nvPr/>
+              </p:nvCxnSpPr>
+              <p:spPr>
+                <a:xfrm flipH="1" flipV="1">
+                  <a:off x="4419600" y="1901298"/>
+                  <a:ext cx="333655" cy="138500"/>
+                </a:xfrm>
+                <a:prstGeom prst="straightConnector1">
+                  <a:avLst/>
+                </a:prstGeom>
+                <a:ln w="19050">
+                  <a:solidFill>
+                    <a:schemeClr val="tx2">
+                      <a:lumMod val="60000"/>
+                      <a:lumOff val="40000"/>
+                    </a:schemeClr>
+                  </a:solidFill>
+                  <a:headEnd type="none" w="med" len="med"/>
+                  <a:tailEnd type="triangle" w="med" len="med"/>
+                </a:ln>
+              </p:spPr>
+              <p:style>
+                <a:lnRef idx="1">
+                  <a:schemeClr val="accent1"/>
+                </a:lnRef>
+                <a:fillRef idx="0">
+                  <a:schemeClr val="accent1"/>
+                </a:fillRef>
+                <a:effectRef idx="0">
+                  <a:schemeClr val="accent1"/>
+                </a:effectRef>
+                <a:fontRef idx="minor">
+                  <a:schemeClr val="tx1"/>
+                </a:fontRef>
+              </p:style>
+            </p:cxnSp>
+            <p:cxnSp>
+              <p:nvCxnSpPr>
+                <p:cNvPr id="35" name="Straight Arrow Connector 34"/>
+                <p:cNvCxnSpPr/>
+                <p:nvPr/>
+              </p:nvCxnSpPr>
+              <p:spPr>
+                <a:xfrm flipH="1" flipV="1">
+                  <a:off x="4758802" y="5586940"/>
+                  <a:ext cx="574624" cy="99527"/>
+                </a:xfrm>
+                <a:prstGeom prst="straightConnector1">
+                  <a:avLst/>
+                </a:prstGeom>
+                <a:ln w="19050">
+                  <a:solidFill>
+                    <a:schemeClr val="tx2">
+                      <a:lumMod val="60000"/>
+                      <a:lumOff val="40000"/>
+                    </a:schemeClr>
+                  </a:solidFill>
+                  <a:headEnd type="none" w="med" len="med"/>
+                  <a:tailEnd type="triangle" w="med" len="med"/>
+                </a:ln>
+              </p:spPr>
+              <p:style>
+                <a:lnRef idx="1">
+                  <a:schemeClr val="accent1"/>
+                </a:lnRef>
+                <a:fillRef idx="0">
+                  <a:schemeClr val="accent1"/>
+                </a:fillRef>
+                <a:effectRef idx="0">
+                  <a:schemeClr val="accent1"/>
+                </a:effectRef>
+                <a:fontRef idx="minor">
+                  <a:schemeClr val="tx1"/>
+                </a:fontRef>
+              </p:style>
+            </p:cxnSp>
+            <p:sp>
+              <p:nvSpPr>
+                <p:cNvPr id="36" name="TextBox 35"/>
+                <p:cNvSpPr txBox="1"/>
+                <p:nvPr/>
+              </p:nvSpPr>
+              <p:spPr>
+                <a:xfrm>
+                  <a:off x="4758802" y="5454027"/>
+                  <a:ext cx="1431482" cy="276999"/>
+                </a:xfrm>
+                <a:prstGeom prst="rect">
+                  <a:avLst/>
+                </a:prstGeom>
+                <a:solidFill>
+                  <a:schemeClr val="accent1">
+                    <a:lumMod val="75000"/>
+                  </a:schemeClr>
+                </a:solidFill>
+                <a:ln w="19050">
+                  <a:solidFill>
+                    <a:schemeClr val="tx2">
+                      <a:lumMod val="60000"/>
+                      <a:lumOff val="40000"/>
+                    </a:schemeClr>
+                  </a:solidFill>
+                  <a:headEnd type="none" w="med" len="med"/>
+                  <a:tailEnd type="triangle" w="med" len="med"/>
+                </a:ln>
+              </p:spPr>
+              <p:txBody>
+                <a:bodyPr wrap="none" rtlCol="0">
+                  <a:spAutoFit/>
+                </a:bodyPr>
+                <a:lstStyle/>
+                <a:p>
+                  <a:pPr algn="ctr"/>
+                  <a:r>
+                    <a:rPr lang="en-US" sz="1200" dirty="0">
+                      <a:solidFill>
+                        <a:schemeClr val="bg1"/>
+                      </a:solidFill>
+                    </a:rPr>
+                    <a:t>m</a:t>
+                  </a:r>
+                  <a:r>
+                    <a:rPr lang="en-US" sz="1200" dirty="0" smtClean="0">
+                      <a:solidFill>
+                        <a:schemeClr val="bg1"/>
+                      </a:solidFill>
+                    </a:rPr>
+                    <a:t>aterial processing</a:t>
+                  </a:r>
+                  <a:endParaRPr lang="en-US" sz="1200" dirty="0">
+                    <a:solidFill>
+                      <a:schemeClr val="bg1"/>
+                    </a:solidFill>
+                  </a:endParaRPr>
+                </a:p>
+              </p:txBody>
+            </p:sp>
+            <p:cxnSp>
+              <p:nvCxnSpPr>
+                <p:cNvPr id="37" name="Straight Arrow Connector 36"/>
+                <p:cNvCxnSpPr>
+                  <a:stCxn id="36" idx="1"/>
+                  <a:endCxn id="14" idx="3"/>
+                </p:cNvCxnSpPr>
+                <p:nvPr/>
+              </p:nvCxnSpPr>
+              <p:spPr>
+                <a:xfrm flipH="1" flipV="1">
+                  <a:off x="4419600" y="5336140"/>
+                  <a:ext cx="339202" cy="256387"/>
+                </a:xfrm>
+                <a:prstGeom prst="straightConnector1">
+                  <a:avLst/>
+                </a:prstGeom>
+                <a:ln w="19050">
+                  <a:solidFill>
+                    <a:schemeClr val="tx2">
+                      <a:lumMod val="60000"/>
+                      <a:lumOff val="40000"/>
+                    </a:schemeClr>
+                  </a:solidFill>
+                  <a:headEnd type="none" w="med" len="med"/>
+                  <a:tailEnd type="triangle" w="med" len="med"/>
+                </a:ln>
+              </p:spPr>
+              <p:style>
+                <a:lnRef idx="1">
+                  <a:schemeClr val="accent1"/>
+                </a:lnRef>
+                <a:fillRef idx="0">
+                  <a:schemeClr val="accent1"/>
+                </a:fillRef>
+                <a:effectRef idx="0">
+                  <a:schemeClr val="accent1"/>
+                </a:effectRef>
+                <a:fontRef idx="minor">
+                  <a:schemeClr val="tx1"/>
+                </a:fontRef>
+              </p:style>
+            </p:cxnSp>
+            <p:sp>
+              <p:nvSpPr>
+                <p:cNvPr id="38" name="TextBox 37"/>
+                <p:cNvSpPr txBox="1"/>
+                <p:nvPr/>
+              </p:nvSpPr>
+              <p:spPr>
+                <a:xfrm>
+                  <a:off x="3317696" y="3396073"/>
+                  <a:ext cx="1101904" cy="276999"/>
+                </a:xfrm>
+                <a:prstGeom prst="rect">
+                  <a:avLst/>
+                </a:prstGeom>
+                <a:solidFill>
+                  <a:schemeClr val="accent6">
+                    <a:lumMod val="75000"/>
+                  </a:schemeClr>
+                </a:solidFill>
+                <a:ln w="19050">
+                  <a:solidFill>
+                    <a:schemeClr val="tx2">
+                      <a:lumMod val="60000"/>
+                      <a:lumOff val="40000"/>
+                    </a:schemeClr>
+                  </a:solidFill>
+                  <a:headEnd type="none" w="med" len="med"/>
+                  <a:tailEnd type="triangle" w="med" len="med"/>
+                </a:ln>
+              </p:spPr>
+              <p:txBody>
+                <a:bodyPr wrap="none" rtlCol="0">
+                  <a:spAutoFit/>
+                </a:bodyPr>
+                <a:lstStyle/>
+                <a:p>
+                  <a:pPr algn="ctr"/>
+                  <a:r>
+                    <a:rPr lang="en-US" sz="1200" dirty="0" smtClean="0">
+                      <a:solidFill>
+                        <a:schemeClr val="bg1"/>
+                      </a:solidFill>
+                    </a:rPr>
+                    <a:t>material entity</a:t>
+                  </a:r>
+                </a:p>
+              </p:txBody>
+            </p:sp>
+            <p:cxnSp>
+              <p:nvCxnSpPr>
+                <p:cNvPr id="39" name="Straight Arrow Connector 38"/>
+                <p:cNvCxnSpPr>
+                  <a:stCxn id="11" idx="3"/>
+                  <a:endCxn id="68" idx="1"/>
+                </p:cNvCxnSpPr>
+                <p:nvPr/>
+              </p:nvCxnSpPr>
+              <p:spPr>
+                <a:xfrm>
+                  <a:off x="1905000" y="2729207"/>
+                  <a:ext cx="237649" cy="805366"/>
+                </a:xfrm>
+                <a:prstGeom prst="straightConnector1">
+                  <a:avLst/>
+                </a:prstGeom>
+                <a:ln w="19050">
+                  <a:headEnd type="triangle" w="med" len="med"/>
+                  <a:tailEnd type="none" w="med" len="med"/>
+                </a:ln>
+              </p:spPr>
+              <p:style>
+                <a:lnRef idx="1">
+                  <a:schemeClr val="accent1"/>
+                </a:lnRef>
+                <a:fillRef idx="0">
+                  <a:schemeClr val="accent1"/>
+                </a:fillRef>
+                <a:effectRef idx="0">
+                  <a:schemeClr val="accent1"/>
+                </a:effectRef>
+                <a:fontRef idx="minor">
+                  <a:schemeClr val="tx1"/>
+                </a:fontRef>
+              </p:style>
+            </p:cxnSp>
+            <p:sp>
+              <p:nvSpPr>
+                <p:cNvPr id="40" name="TextBox 39"/>
+                <p:cNvSpPr txBox="1"/>
+                <p:nvPr/>
+              </p:nvSpPr>
+              <p:spPr>
+                <a:xfrm>
+                  <a:off x="3317696" y="5791107"/>
+                  <a:ext cx="1101904" cy="461665"/>
+                </a:xfrm>
+                <a:prstGeom prst="rect">
+                  <a:avLst/>
+                </a:prstGeom>
+                <a:solidFill>
+                  <a:srgbClr val="C00000"/>
+                </a:solidFill>
+                <a:ln w="19050">
+                  <a:solidFill>
+                    <a:schemeClr val="tx2">
+                      <a:lumMod val="60000"/>
+                      <a:lumOff val="40000"/>
+                    </a:schemeClr>
+                  </a:solidFill>
+                  <a:headEnd type="none" w="med" len="med"/>
+                  <a:tailEnd type="triangle" w="med" len="med"/>
+                </a:ln>
+              </p:spPr>
+              <p:txBody>
+                <a:bodyPr wrap="square" rtlCol="0">
+                  <a:spAutoFit/>
+                </a:bodyPr>
+                <a:lstStyle/>
+                <a:p>
+                  <a:pPr algn="ctr"/>
+                  <a:r>
+                    <a:rPr lang="en-US" sz="1200" dirty="0" smtClean="0">
+                      <a:solidFill>
+                        <a:schemeClr val="bg1"/>
+                      </a:solidFill>
+                    </a:rPr>
+                    <a:t>biological</a:t>
+                  </a:r>
+                </a:p>
+                <a:p>
+                  <a:pPr algn="ctr"/>
+                  <a:r>
+                    <a:rPr lang="en-US" sz="1200" dirty="0" smtClean="0">
+                      <a:solidFill>
+                        <a:schemeClr val="bg1"/>
+                      </a:solidFill>
+                    </a:rPr>
+                    <a:t>process (GO)</a:t>
+                  </a:r>
+                  <a:endParaRPr lang="en-US" sz="1200" dirty="0">
+                    <a:solidFill>
+                      <a:schemeClr val="bg1"/>
+                    </a:solidFill>
+                  </a:endParaRPr>
+                </a:p>
+              </p:txBody>
+            </p:sp>
+            <p:cxnSp>
+              <p:nvCxnSpPr>
+                <p:cNvPr id="41" name="Straight Arrow Connector 40"/>
+                <p:cNvCxnSpPr>
+                  <a:stCxn id="65" idx="3"/>
+                  <a:endCxn id="40" idx="1"/>
+                </p:cNvCxnSpPr>
+                <p:nvPr/>
+              </p:nvCxnSpPr>
+              <p:spPr>
+                <a:xfrm>
+                  <a:off x="3124200" y="5661798"/>
+                  <a:ext cx="193496" cy="360142"/>
+                </a:xfrm>
+                <a:prstGeom prst="straightConnector1">
+                  <a:avLst/>
+                </a:prstGeom>
+                <a:ln w="19050">
+                  <a:headEnd type="triangle" w="med" len="med"/>
+                  <a:tailEnd type="none" w="med" len="med"/>
+                </a:ln>
+              </p:spPr>
+              <p:style>
+                <a:lnRef idx="1">
+                  <a:schemeClr val="accent1"/>
+                </a:lnRef>
+                <a:fillRef idx="0">
+                  <a:schemeClr val="accent1"/>
+                </a:fillRef>
+                <a:effectRef idx="0">
+                  <a:schemeClr val="accent1"/>
+                </a:effectRef>
+                <a:fontRef idx="minor">
+                  <a:schemeClr val="tx1"/>
+                </a:fontRef>
+              </p:style>
+            </p:cxnSp>
+            <p:sp>
+              <p:nvSpPr>
+                <p:cNvPr id="42" name="TextBox 41"/>
+                <p:cNvSpPr txBox="1"/>
+                <p:nvPr/>
+              </p:nvSpPr>
+              <p:spPr>
+                <a:xfrm>
+                  <a:off x="4758802" y="5143640"/>
+                  <a:ext cx="1553887" cy="276999"/>
+                </a:xfrm>
+                <a:prstGeom prst="rect">
+                  <a:avLst/>
+                </a:prstGeom>
+                <a:solidFill>
+                  <a:schemeClr val="accent1">
+                    <a:lumMod val="75000"/>
+                  </a:schemeClr>
+                </a:solidFill>
+                <a:ln w="19050">
+                  <a:solidFill>
+                    <a:schemeClr val="tx2">
+                      <a:lumMod val="60000"/>
+                      <a:lumOff val="40000"/>
+                    </a:schemeClr>
+                  </a:solidFill>
+                  <a:headEnd type="none" w="med" len="med"/>
+                  <a:tailEnd type="triangle" w="med" len="med"/>
+                </a:ln>
+              </p:spPr>
+              <p:txBody>
+                <a:bodyPr wrap="none" rtlCol="0">
+                  <a:spAutoFit/>
+                </a:bodyPr>
+                <a:lstStyle/>
+                <a:p>
+                  <a:pPr algn="ctr"/>
+                  <a:r>
+                    <a:rPr lang="en-US" sz="1200" dirty="0" smtClean="0">
+                      <a:solidFill>
+                        <a:schemeClr val="bg1"/>
+                      </a:solidFill>
+                    </a:rPr>
+                    <a:t>material maintenance</a:t>
+                  </a:r>
+                  <a:endParaRPr lang="en-US" sz="1200" dirty="0">
+                    <a:solidFill>
+                      <a:schemeClr val="bg1"/>
+                    </a:solidFill>
+                  </a:endParaRPr>
+                </a:p>
+              </p:txBody>
+            </p:sp>
+            <p:cxnSp>
+              <p:nvCxnSpPr>
+                <p:cNvPr id="43" name="Straight Arrow Connector 42"/>
+                <p:cNvCxnSpPr>
+                  <a:stCxn id="14" idx="3"/>
+                  <a:endCxn id="42" idx="1"/>
+                </p:cNvCxnSpPr>
+                <p:nvPr/>
+              </p:nvCxnSpPr>
+              <p:spPr>
+                <a:xfrm flipV="1">
+                  <a:off x="4419600" y="5282140"/>
+                  <a:ext cx="339202" cy="54000"/>
+                </a:xfrm>
+                <a:prstGeom prst="straightConnector1">
+                  <a:avLst/>
+                </a:prstGeom>
+                <a:ln w="19050">
+                  <a:headEnd type="triangle" w="med" len="med"/>
+                  <a:tailEnd type="none" w="med" len="med"/>
+                </a:ln>
+              </p:spPr>
+              <p:style>
+                <a:lnRef idx="1">
+                  <a:schemeClr val="accent1"/>
+                </a:lnRef>
+                <a:fillRef idx="0">
+                  <a:schemeClr val="accent1"/>
+                </a:fillRef>
+                <a:effectRef idx="0">
+                  <a:schemeClr val="accent1"/>
+                </a:effectRef>
+                <a:fontRef idx="minor">
+                  <a:schemeClr val="tx1"/>
+                </a:fontRef>
+              </p:style>
+            </p:cxnSp>
+            <p:sp>
+              <p:nvSpPr>
+                <p:cNvPr id="44" name="TextBox 43"/>
+                <p:cNvSpPr txBox="1"/>
+                <p:nvPr/>
+              </p:nvSpPr>
+              <p:spPr>
+                <a:xfrm>
+                  <a:off x="4753255" y="2923308"/>
+                  <a:ext cx="1373326" cy="276999"/>
+                </a:xfrm>
+                <a:prstGeom prst="rect">
+                  <a:avLst/>
+                </a:prstGeom>
+                <a:solidFill>
+                  <a:schemeClr val="accent1">
+                    <a:lumMod val="75000"/>
+                  </a:schemeClr>
+                </a:solidFill>
+                <a:ln w="19050">
+                  <a:solidFill>
+                    <a:schemeClr val="tx2">
+                      <a:lumMod val="60000"/>
+                      <a:lumOff val="40000"/>
+                    </a:schemeClr>
+                  </a:solidFill>
+                  <a:headEnd type="none" w="med" len="med"/>
+                  <a:tailEnd type="triangle" w="med" len="med"/>
+                </a:ln>
+              </p:spPr>
+              <p:txBody>
+                <a:bodyPr wrap="none" rtlCol="0">
+                  <a:spAutoFit/>
+                </a:bodyPr>
+                <a:lstStyle/>
+                <a:p>
+                  <a:pPr algn="ctr"/>
+                  <a:r>
+                    <a:rPr lang="en-US" sz="1200" dirty="0" smtClean="0">
+                      <a:solidFill>
+                        <a:schemeClr val="bg1"/>
+                      </a:solidFill>
+                    </a:rPr>
+                    <a:t>processed material</a:t>
+                  </a:r>
+                  <a:endParaRPr lang="en-US" sz="1200" dirty="0">
+                    <a:solidFill>
+                      <a:schemeClr val="bg1"/>
+                    </a:solidFill>
+                  </a:endParaRPr>
+                </a:p>
+              </p:txBody>
+            </p:sp>
+            <p:sp>
+              <p:nvSpPr>
+                <p:cNvPr id="45" name="TextBox 44"/>
+                <p:cNvSpPr txBox="1"/>
+                <p:nvPr/>
+              </p:nvSpPr>
+              <p:spPr>
+                <a:xfrm>
+                  <a:off x="4753255" y="2618508"/>
+                  <a:ext cx="784190" cy="276999"/>
+                </a:xfrm>
+                <a:prstGeom prst="rect">
+                  <a:avLst/>
+                </a:prstGeom>
+                <a:solidFill>
+                  <a:schemeClr val="accent1">
+                    <a:lumMod val="75000"/>
+                  </a:schemeClr>
+                </a:solidFill>
+                <a:ln w="19050">
+                  <a:solidFill>
+                    <a:schemeClr val="tx2">
+                      <a:lumMod val="60000"/>
+                      <a:lumOff val="40000"/>
+                    </a:schemeClr>
+                  </a:solidFill>
+                  <a:headEnd type="none" w="med" len="med"/>
+                  <a:tailEnd type="triangle" w="med" len="med"/>
+                </a:ln>
+              </p:spPr>
+              <p:txBody>
+                <a:bodyPr wrap="none" rtlCol="0">
+                  <a:spAutoFit/>
+                </a:bodyPr>
+                <a:lstStyle/>
+                <a:p>
+                  <a:pPr algn="ctr"/>
+                  <a:r>
+                    <a:rPr lang="en-US" sz="1200" dirty="0" smtClean="0">
+                      <a:solidFill>
+                        <a:schemeClr val="bg1"/>
+                      </a:solidFill>
+                    </a:rPr>
+                    <a:t>specimen</a:t>
+                  </a:r>
+                  <a:endParaRPr lang="en-US" sz="1200" dirty="0">
+                    <a:solidFill>
+                      <a:schemeClr val="bg1"/>
+                    </a:solidFill>
+                  </a:endParaRPr>
+                </a:p>
+              </p:txBody>
+            </p:sp>
+            <p:sp>
+              <p:nvSpPr>
+                <p:cNvPr id="46" name="TextBox 45"/>
+                <p:cNvSpPr txBox="1"/>
+                <p:nvPr/>
+              </p:nvSpPr>
+              <p:spPr>
+                <a:xfrm>
+                  <a:off x="4753255" y="3837708"/>
+                  <a:ext cx="2013565" cy="276999"/>
+                </a:xfrm>
+                <a:prstGeom prst="rect">
+                  <a:avLst/>
+                </a:prstGeom>
+                <a:solidFill>
+                  <a:srgbClr val="C00000"/>
+                </a:solidFill>
+                <a:ln w="19050">
+                  <a:solidFill>
+                    <a:schemeClr val="tx2">
+                      <a:lumMod val="60000"/>
+                      <a:lumOff val="40000"/>
+                    </a:schemeClr>
+                  </a:solidFill>
+                  <a:headEnd type="none" w="med" len="med"/>
+                  <a:tailEnd type="triangle" w="med" len="med"/>
+                </a:ln>
+              </p:spPr>
+              <p:txBody>
+                <a:bodyPr wrap="none" rtlCol="0">
+                  <a:spAutoFit/>
+                </a:bodyPr>
+                <a:lstStyle/>
+                <a:p>
+                  <a:pPr algn="ctr"/>
+                  <a:r>
+                    <a:rPr lang="en-US" sz="1200" dirty="0" smtClean="0">
+                      <a:solidFill>
+                        <a:schemeClr val="bg1"/>
+                      </a:solidFill>
+                    </a:rPr>
+                    <a:t>gross anatomical part (CARO)</a:t>
+                  </a:r>
+                </a:p>
+              </p:txBody>
+            </p:sp>
+            <p:sp>
+              <p:nvSpPr>
+                <p:cNvPr id="47" name="TextBox 46"/>
+                <p:cNvSpPr txBox="1"/>
+                <p:nvPr/>
+              </p:nvSpPr>
+              <p:spPr>
+                <a:xfrm>
+                  <a:off x="4753255" y="4142508"/>
+                  <a:ext cx="1879810" cy="276999"/>
+                </a:xfrm>
+                <a:prstGeom prst="rect">
+                  <a:avLst/>
+                </a:prstGeom>
+                <a:solidFill>
+                  <a:srgbClr val="C00000"/>
+                </a:solidFill>
+                <a:ln w="19050">
+                  <a:solidFill>
+                    <a:schemeClr val="tx2">
+                      <a:lumMod val="60000"/>
+                      <a:lumOff val="40000"/>
+                    </a:schemeClr>
+                  </a:solidFill>
+                  <a:headEnd type="none" w="med" len="med"/>
+                  <a:tailEnd type="triangle" w="med" len="med"/>
+                </a:ln>
+              </p:spPr>
+              <p:txBody>
+                <a:bodyPr wrap="none" rtlCol="0">
+                  <a:spAutoFit/>
+                </a:bodyPr>
+                <a:lstStyle/>
+                <a:p>
+                  <a:pPr algn="ctr"/>
+                  <a:r>
+                    <a:rPr lang="en-US" sz="1200" dirty="0" smtClean="0">
+                      <a:solidFill>
+                        <a:schemeClr val="bg1"/>
+                      </a:solidFill>
+                    </a:rPr>
+                    <a:t>organism (NCBI taxonomy)</a:t>
+                  </a:r>
+                </a:p>
+              </p:txBody>
+            </p:sp>
+            <p:sp>
+              <p:nvSpPr>
+                <p:cNvPr id="48" name="TextBox 47"/>
+                <p:cNvSpPr txBox="1"/>
+                <p:nvPr/>
+              </p:nvSpPr>
+              <p:spPr>
+                <a:xfrm>
+                  <a:off x="4753255" y="3532908"/>
+                  <a:ext cx="1694888" cy="276999"/>
+                </a:xfrm>
+                <a:prstGeom prst="rect">
+                  <a:avLst/>
+                </a:prstGeom>
+                <a:solidFill>
+                  <a:srgbClr val="C00000"/>
+                </a:solidFill>
+                <a:ln w="19050">
+                  <a:solidFill>
+                    <a:schemeClr val="tx2">
+                      <a:lumMod val="60000"/>
+                      <a:lumOff val="40000"/>
+                    </a:schemeClr>
+                  </a:solidFill>
+                  <a:headEnd type="none" w="med" len="med"/>
+                  <a:tailEnd type="triangle" w="med" len="med"/>
+                </a:ln>
+              </p:spPr>
+              <p:txBody>
+                <a:bodyPr wrap="none" rtlCol="0">
+                  <a:spAutoFit/>
+                </a:bodyPr>
+                <a:lstStyle/>
+                <a:p>
+                  <a:pPr algn="ctr"/>
+                  <a:r>
+                    <a:rPr lang="en-US" sz="1200" dirty="0" smtClean="0">
+                      <a:solidFill>
+                        <a:schemeClr val="bg1"/>
+                      </a:solidFill>
+                    </a:rPr>
+                    <a:t>molecular entity (</a:t>
+                  </a:r>
+                  <a:r>
+                    <a:rPr lang="en-US" sz="1200" dirty="0" err="1" smtClean="0">
+                      <a:solidFill>
+                        <a:schemeClr val="bg1"/>
+                      </a:solidFill>
+                    </a:rPr>
+                    <a:t>ChEBI</a:t>
+                  </a:r>
+                  <a:r>
+                    <a:rPr lang="en-US" sz="1200" dirty="0" smtClean="0">
+                      <a:solidFill>
+                        <a:schemeClr val="bg1"/>
+                      </a:solidFill>
+                    </a:rPr>
+                    <a:t>)</a:t>
+                  </a:r>
+                </a:p>
+              </p:txBody>
+            </p:sp>
+            <p:sp>
+              <p:nvSpPr>
+                <p:cNvPr id="49" name="TextBox 48"/>
+                <p:cNvSpPr txBox="1"/>
+                <p:nvPr/>
+              </p:nvSpPr>
+              <p:spPr>
+                <a:xfrm>
+                  <a:off x="4753255" y="3228108"/>
+                  <a:ext cx="954750" cy="276999"/>
+                </a:xfrm>
+                <a:prstGeom prst="rect">
+                  <a:avLst/>
+                </a:prstGeom>
+                <a:solidFill>
+                  <a:schemeClr val="accent1">
+                    <a:lumMod val="75000"/>
+                  </a:schemeClr>
+                </a:solidFill>
+                <a:ln w="19050">
+                  <a:solidFill>
+                    <a:schemeClr val="tx2">
+                      <a:lumMod val="60000"/>
+                      <a:lumOff val="40000"/>
+                    </a:schemeClr>
+                  </a:solidFill>
+                  <a:headEnd type="none" w="med" len="med"/>
+                  <a:tailEnd type="triangle" w="med" len="med"/>
+                </a:ln>
+              </p:spPr>
+              <p:txBody>
+                <a:bodyPr wrap="none" rtlCol="0">
+                  <a:spAutoFit/>
+                </a:bodyPr>
+                <a:lstStyle/>
+                <a:p>
+                  <a:pPr algn="ctr"/>
+                  <a:r>
+                    <a:rPr lang="en-US" sz="1200" dirty="0" smtClean="0">
+                      <a:solidFill>
+                        <a:schemeClr val="bg1"/>
+                      </a:solidFill>
+                    </a:rPr>
+                    <a:t>organization</a:t>
+                  </a:r>
+                  <a:endParaRPr lang="en-US" sz="1200" dirty="0">
+                    <a:solidFill>
+                      <a:schemeClr val="bg1"/>
+                    </a:solidFill>
+                  </a:endParaRPr>
+                </a:p>
+              </p:txBody>
+            </p:sp>
+            <p:sp>
+              <p:nvSpPr>
+                <p:cNvPr id="50" name="TextBox 49"/>
+                <p:cNvSpPr txBox="1"/>
+                <p:nvPr/>
+              </p:nvSpPr>
+              <p:spPr>
+                <a:xfrm>
+                  <a:off x="6619967" y="3059503"/>
+                  <a:ext cx="587854" cy="276999"/>
+                </a:xfrm>
+                <a:prstGeom prst="rect">
+                  <a:avLst/>
+                </a:prstGeom>
+                <a:solidFill>
+                  <a:schemeClr val="accent1">
+                    <a:lumMod val="75000"/>
+                  </a:schemeClr>
+                </a:solidFill>
+                <a:ln w="19050">
+                  <a:solidFill>
+                    <a:schemeClr val="tx2">
+                      <a:lumMod val="60000"/>
+                      <a:lumOff val="40000"/>
+                    </a:schemeClr>
+                  </a:solidFill>
+                  <a:headEnd type="none" w="med" len="med"/>
+                  <a:tailEnd type="triangle" w="med" len="med"/>
+                </a:ln>
+              </p:spPr>
+              <p:txBody>
+                <a:bodyPr wrap="none" rtlCol="0">
+                  <a:spAutoFit/>
+                </a:bodyPr>
+                <a:lstStyle/>
+                <a:p>
+                  <a:pPr algn="ctr"/>
+                  <a:r>
+                    <a:rPr lang="en-US" sz="1200" dirty="0" smtClean="0">
+                      <a:solidFill>
+                        <a:schemeClr val="bg1"/>
+                      </a:solidFill>
+                    </a:rPr>
+                    <a:t>device</a:t>
+                  </a:r>
+                  <a:endParaRPr lang="en-US" sz="1200" dirty="0">
+                    <a:solidFill>
+                      <a:schemeClr val="bg1"/>
+                    </a:solidFill>
+                  </a:endParaRPr>
+                </a:p>
+              </p:txBody>
+            </p:sp>
+            <p:cxnSp>
+              <p:nvCxnSpPr>
+                <p:cNvPr id="51" name="Straight Arrow Connector 50"/>
+                <p:cNvCxnSpPr>
+                  <a:stCxn id="38" idx="3"/>
+                  <a:endCxn id="45" idx="1"/>
+                </p:cNvCxnSpPr>
+                <p:nvPr/>
+              </p:nvCxnSpPr>
+              <p:spPr>
+                <a:xfrm flipV="1">
+                  <a:off x="4419600" y="2757008"/>
+                  <a:ext cx="333655" cy="777565"/>
+                </a:xfrm>
+                <a:prstGeom prst="straightConnector1">
+                  <a:avLst/>
+                </a:prstGeom>
+                <a:ln w="19050">
+                  <a:headEnd type="triangle" w="med" len="med"/>
+                  <a:tailEnd type="none" w="med" len="med"/>
+                </a:ln>
+              </p:spPr>
+              <p:style>
+                <a:lnRef idx="1">
+                  <a:schemeClr val="accent1"/>
+                </a:lnRef>
+                <a:fillRef idx="0">
+                  <a:schemeClr val="accent1"/>
+                </a:fillRef>
+                <a:effectRef idx="0">
+                  <a:schemeClr val="accent1"/>
+                </a:effectRef>
+                <a:fontRef idx="minor">
+                  <a:schemeClr val="tx1"/>
+                </a:fontRef>
+              </p:style>
+            </p:cxnSp>
+            <p:cxnSp>
+              <p:nvCxnSpPr>
+                <p:cNvPr id="52" name="Straight Arrow Connector 51"/>
+                <p:cNvCxnSpPr>
+                  <a:stCxn id="38" idx="3"/>
+                  <a:endCxn id="44" idx="1"/>
+                </p:cNvCxnSpPr>
+                <p:nvPr/>
+              </p:nvCxnSpPr>
+              <p:spPr>
+                <a:xfrm flipV="1">
+                  <a:off x="4419600" y="3061808"/>
+                  <a:ext cx="333655" cy="472765"/>
+                </a:xfrm>
+                <a:prstGeom prst="straightConnector1">
+                  <a:avLst/>
+                </a:prstGeom>
+                <a:ln w="19050">
+                  <a:headEnd type="triangle" w="med" len="med"/>
+                  <a:tailEnd type="none" w="med" len="med"/>
+                </a:ln>
+              </p:spPr>
+              <p:style>
+                <a:lnRef idx="1">
+                  <a:schemeClr val="accent1"/>
+                </a:lnRef>
+                <a:fillRef idx="0">
+                  <a:schemeClr val="accent1"/>
+                </a:fillRef>
+                <a:effectRef idx="0">
+                  <a:schemeClr val="accent1"/>
+                </a:effectRef>
+                <a:fontRef idx="minor">
+                  <a:schemeClr val="tx1"/>
+                </a:fontRef>
+              </p:style>
+            </p:cxnSp>
+            <p:cxnSp>
+              <p:nvCxnSpPr>
+                <p:cNvPr id="53" name="Straight Arrow Connector 52"/>
+                <p:cNvCxnSpPr>
+                  <a:stCxn id="38" idx="3"/>
+                  <a:endCxn id="49" idx="1"/>
+                </p:cNvCxnSpPr>
+                <p:nvPr/>
+              </p:nvCxnSpPr>
+              <p:spPr>
+                <a:xfrm flipV="1">
+                  <a:off x="4419600" y="3366608"/>
+                  <a:ext cx="333655" cy="167965"/>
+                </a:xfrm>
+                <a:prstGeom prst="straightConnector1">
+                  <a:avLst/>
+                </a:prstGeom>
+                <a:ln w="19050">
+                  <a:headEnd type="triangle" w="med" len="med"/>
+                  <a:tailEnd type="none" w="med" len="med"/>
+                </a:ln>
+              </p:spPr>
+              <p:style>
+                <a:lnRef idx="1">
+                  <a:schemeClr val="accent1"/>
+                </a:lnRef>
+                <a:fillRef idx="0">
+                  <a:schemeClr val="accent1"/>
+                </a:fillRef>
+                <a:effectRef idx="0">
+                  <a:schemeClr val="accent1"/>
+                </a:effectRef>
+                <a:fontRef idx="minor">
+                  <a:schemeClr val="tx1"/>
+                </a:fontRef>
+              </p:style>
+            </p:cxnSp>
+            <p:cxnSp>
+              <p:nvCxnSpPr>
+                <p:cNvPr id="54" name="Straight Arrow Connector 53"/>
+                <p:cNvCxnSpPr>
+                  <a:stCxn id="38" idx="3"/>
+                  <a:endCxn id="48" idx="1"/>
+                </p:cNvCxnSpPr>
+                <p:nvPr/>
+              </p:nvCxnSpPr>
+              <p:spPr>
+                <a:xfrm>
+                  <a:off x="4419600" y="3534573"/>
+                  <a:ext cx="333655" cy="136835"/>
+                </a:xfrm>
+                <a:prstGeom prst="straightConnector1">
+                  <a:avLst/>
+                </a:prstGeom>
+                <a:ln w="19050">
+                  <a:headEnd type="triangle" w="med" len="med"/>
+                  <a:tailEnd type="none" w="med" len="med"/>
+                </a:ln>
+              </p:spPr>
+              <p:style>
+                <a:lnRef idx="1">
+                  <a:schemeClr val="accent1"/>
+                </a:lnRef>
+                <a:fillRef idx="0">
+                  <a:schemeClr val="accent1"/>
+                </a:fillRef>
+                <a:effectRef idx="0">
+                  <a:schemeClr val="accent1"/>
+                </a:effectRef>
+                <a:fontRef idx="minor">
+                  <a:schemeClr val="tx1"/>
+                </a:fontRef>
+              </p:style>
+            </p:cxnSp>
+            <p:cxnSp>
+              <p:nvCxnSpPr>
+                <p:cNvPr id="55" name="Straight Arrow Connector 54"/>
+                <p:cNvCxnSpPr>
+                  <a:stCxn id="38" idx="3"/>
+                  <a:endCxn id="46" idx="1"/>
+                </p:cNvCxnSpPr>
+                <p:nvPr/>
+              </p:nvCxnSpPr>
+              <p:spPr>
+                <a:xfrm>
+                  <a:off x="4419600" y="3534573"/>
+                  <a:ext cx="333655" cy="441635"/>
+                </a:xfrm>
+                <a:prstGeom prst="straightConnector1">
+                  <a:avLst/>
+                </a:prstGeom>
+                <a:ln w="19050">
+                  <a:headEnd type="triangle" w="med" len="med"/>
+                  <a:tailEnd type="none" w="med" len="med"/>
+                </a:ln>
+              </p:spPr>
+              <p:style>
+                <a:lnRef idx="1">
+                  <a:schemeClr val="accent1"/>
+                </a:lnRef>
+                <a:fillRef idx="0">
+                  <a:schemeClr val="accent1"/>
+                </a:fillRef>
+                <a:effectRef idx="0">
+                  <a:schemeClr val="accent1"/>
+                </a:effectRef>
+                <a:fontRef idx="minor">
+                  <a:schemeClr val="tx1"/>
+                </a:fontRef>
+              </p:style>
+            </p:cxnSp>
+            <p:cxnSp>
+              <p:nvCxnSpPr>
+                <p:cNvPr id="56" name="Straight Arrow Connector 55"/>
+                <p:cNvCxnSpPr>
+                  <a:stCxn id="38" idx="3"/>
+                  <a:endCxn id="47" idx="1"/>
+                </p:cNvCxnSpPr>
+                <p:nvPr/>
+              </p:nvCxnSpPr>
+              <p:spPr>
+                <a:xfrm>
+                  <a:off x="4419600" y="3534573"/>
+                  <a:ext cx="333655" cy="746435"/>
+                </a:xfrm>
+                <a:prstGeom prst="straightConnector1">
+                  <a:avLst/>
+                </a:prstGeom>
+                <a:ln w="19050">
+                  <a:headEnd type="triangle" w="med" len="med"/>
+                  <a:tailEnd type="none" w="med" len="med"/>
+                </a:ln>
+              </p:spPr>
+              <p:style>
+                <a:lnRef idx="1">
+                  <a:schemeClr val="accent1"/>
+                </a:lnRef>
+                <a:fillRef idx="0">
+                  <a:schemeClr val="accent1"/>
+                </a:fillRef>
+                <a:effectRef idx="0">
+                  <a:schemeClr val="accent1"/>
+                </a:effectRef>
+                <a:fontRef idx="minor">
+                  <a:schemeClr val="tx1"/>
+                </a:fontRef>
+              </p:style>
+            </p:cxnSp>
+            <p:cxnSp>
+              <p:nvCxnSpPr>
+                <p:cNvPr id="57" name="Straight Arrow Connector 56"/>
+                <p:cNvCxnSpPr>
+                  <a:stCxn id="44" idx="3"/>
+                  <a:endCxn id="50" idx="1"/>
+                </p:cNvCxnSpPr>
+                <p:nvPr/>
+              </p:nvCxnSpPr>
+              <p:spPr>
+                <a:xfrm>
+                  <a:off x="6126581" y="3061808"/>
+                  <a:ext cx="493386" cy="136195"/>
+                </a:xfrm>
+                <a:prstGeom prst="straightConnector1">
+                  <a:avLst/>
+                </a:prstGeom>
+                <a:ln w="19050">
+                  <a:headEnd type="triangle" w="med" len="med"/>
+                  <a:tailEnd type="none" w="med" len="med"/>
+                </a:ln>
+              </p:spPr>
+              <p:style>
+                <a:lnRef idx="1">
+                  <a:schemeClr val="accent1"/>
+                </a:lnRef>
+                <a:fillRef idx="0">
+                  <a:schemeClr val="accent1"/>
+                </a:fillRef>
+                <a:effectRef idx="0">
+                  <a:schemeClr val="accent1"/>
+                </a:effectRef>
+                <a:fontRef idx="minor">
+                  <a:schemeClr val="tx1"/>
+                </a:fontRef>
+              </p:style>
+            </p:cxnSp>
+            <p:sp>
+              <p:nvSpPr>
+                <p:cNvPr id="58" name="TextBox 57"/>
+                <p:cNvSpPr txBox="1"/>
+                <p:nvPr/>
+              </p:nvSpPr>
+              <p:spPr>
+                <a:xfrm>
+                  <a:off x="6619967" y="2743200"/>
+                  <a:ext cx="1453347" cy="276999"/>
+                </a:xfrm>
+                <a:prstGeom prst="rect">
+                  <a:avLst/>
+                </a:prstGeom>
+                <a:solidFill>
+                  <a:schemeClr val="accent1">
+                    <a:lumMod val="75000"/>
+                  </a:schemeClr>
+                </a:solidFill>
+                <a:ln w="19050">
+                  <a:solidFill>
+                    <a:schemeClr val="tx2">
+                      <a:lumMod val="60000"/>
+                      <a:lumOff val="40000"/>
+                    </a:schemeClr>
+                  </a:solidFill>
+                  <a:headEnd type="none" w="med" len="med"/>
+                  <a:tailEnd type="triangle" w="med" len="med"/>
+                </a:ln>
+              </p:spPr>
+              <p:txBody>
+                <a:bodyPr wrap="none" rtlCol="0">
+                  <a:spAutoFit/>
+                </a:bodyPr>
+                <a:lstStyle/>
+                <a:p>
+                  <a:pPr algn="ctr"/>
+                  <a:r>
+                    <a:rPr lang="en-US" sz="1200" dirty="0" smtClean="0">
+                      <a:solidFill>
+                        <a:schemeClr val="bg1"/>
+                      </a:solidFill>
+                    </a:rPr>
+                    <a:t>processed specimen</a:t>
+                  </a:r>
+                  <a:endParaRPr lang="en-US" sz="1200" dirty="0">
+                    <a:solidFill>
+                      <a:schemeClr val="bg1"/>
+                    </a:solidFill>
+                  </a:endParaRPr>
+                </a:p>
+              </p:txBody>
+            </p:sp>
+            <p:cxnSp>
+              <p:nvCxnSpPr>
+                <p:cNvPr id="59" name="Straight Arrow Connector 58"/>
+                <p:cNvCxnSpPr>
+                  <a:stCxn id="44" idx="3"/>
+                  <a:endCxn id="58" idx="1"/>
+                </p:cNvCxnSpPr>
+                <p:nvPr/>
+              </p:nvCxnSpPr>
+              <p:spPr>
+                <a:xfrm flipV="1">
+                  <a:off x="6126581" y="2881700"/>
+                  <a:ext cx="493386" cy="180108"/>
+                </a:xfrm>
+                <a:prstGeom prst="straightConnector1">
+                  <a:avLst/>
+                </a:prstGeom>
+                <a:ln w="19050">
+                  <a:headEnd type="triangle" w="med" len="med"/>
+                  <a:tailEnd type="none" w="med" len="med"/>
+                </a:ln>
+              </p:spPr>
+              <p:style>
+                <a:lnRef idx="1">
+                  <a:schemeClr val="accent1"/>
+                </a:lnRef>
+                <a:fillRef idx="0">
+                  <a:schemeClr val="accent1"/>
+                </a:fillRef>
+                <a:effectRef idx="0">
+                  <a:schemeClr val="accent1"/>
+                </a:effectRef>
+                <a:fontRef idx="minor">
+                  <a:schemeClr val="tx1"/>
+                </a:fontRef>
+              </p:style>
+            </p:cxnSp>
+            <p:cxnSp>
+              <p:nvCxnSpPr>
+                <p:cNvPr id="60" name="Straight Arrow Connector 59"/>
+                <p:cNvCxnSpPr>
+                  <a:stCxn id="45" idx="3"/>
+                  <a:endCxn id="58" idx="1"/>
+                </p:cNvCxnSpPr>
+                <p:nvPr/>
+              </p:nvCxnSpPr>
+              <p:spPr>
+                <a:xfrm>
+                  <a:off x="5537445" y="2757008"/>
+                  <a:ext cx="1082522" cy="124692"/>
+                </a:xfrm>
+                <a:prstGeom prst="straightConnector1">
+                  <a:avLst/>
+                </a:prstGeom>
+                <a:ln w="19050">
+                  <a:headEnd type="triangle" w="med" len="med"/>
+                  <a:tailEnd type="none" w="med" len="med"/>
+                </a:ln>
+              </p:spPr>
+              <p:style>
+                <a:lnRef idx="1">
+                  <a:schemeClr val="accent1"/>
+                </a:lnRef>
+                <a:fillRef idx="0">
+                  <a:schemeClr val="accent1"/>
+                </a:fillRef>
+                <a:effectRef idx="0">
+                  <a:schemeClr val="accent1"/>
+                </a:effectRef>
+                <a:fontRef idx="minor">
+                  <a:schemeClr val="tx1"/>
+                </a:fontRef>
+              </p:style>
+            </p:cxnSp>
+            <p:sp>
+              <p:nvSpPr>
+                <p:cNvPr id="61" name="TextBox 60"/>
+                <p:cNvSpPr txBox="1"/>
+                <p:nvPr/>
+              </p:nvSpPr>
+              <p:spPr>
+                <a:xfrm>
+                  <a:off x="6619967" y="2211509"/>
+                  <a:ext cx="965201" cy="276999"/>
+                </a:xfrm>
+                <a:prstGeom prst="rect">
+                  <a:avLst/>
+                </a:prstGeom>
+                <a:solidFill>
+                  <a:schemeClr val="accent1">
+                    <a:lumMod val="75000"/>
+                  </a:schemeClr>
+                </a:solidFill>
+                <a:ln w="19050">
+                  <a:solidFill>
+                    <a:schemeClr val="tx2">
+                      <a:lumMod val="60000"/>
+                      <a:lumOff val="40000"/>
+                    </a:schemeClr>
+                  </a:solidFill>
+                  <a:headEnd type="none" w="med" len="med"/>
+                  <a:tailEnd type="triangle" w="med" len="med"/>
+                </a:ln>
+              </p:spPr>
+              <p:txBody>
+                <a:bodyPr wrap="none" rtlCol="0">
+                  <a:spAutoFit/>
+                </a:bodyPr>
+                <a:lstStyle/>
+                <a:p>
+                  <a:pPr algn="ctr"/>
+                  <a:r>
+                    <a:rPr lang="en-US" sz="1200" dirty="0">
+                      <a:solidFill>
+                        <a:schemeClr val="bg1"/>
+                      </a:solidFill>
+                    </a:rPr>
+                    <a:t>s</a:t>
+                  </a:r>
+                  <a:r>
+                    <a:rPr lang="en-US" sz="1200" dirty="0" smtClean="0">
+                      <a:solidFill>
+                        <a:schemeClr val="bg1"/>
+                      </a:solidFill>
+                    </a:rPr>
+                    <a:t>tudy design</a:t>
+                  </a:r>
+                  <a:endParaRPr lang="en-US" sz="1200" dirty="0">
+                    <a:solidFill>
+                      <a:schemeClr val="bg1"/>
+                    </a:solidFill>
+                  </a:endParaRPr>
+                </a:p>
+              </p:txBody>
+            </p:sp>
+            <p:cxnSp>
+              <p:nvCxnSpPr>
+                <p:cNvPr id="62" name="Straight Arrow Connector 61"/>
+                <p:cNvCxnSpPr/>
+                <p:nvPr/>
+              </p:nvCxnSpPr>
+              <p:spPr>
+                <a:xfrm flipH="1">
+                  <a:off x="6028477" y="2350008"/>
+                  <a:ext cx="591490" cy="0"/>
+                </a:xfrm>
+                <a:prstGeom prst="straightConnector1">
+                  <a:avLst/>
+                </a:prstGeom>
+                <a:ln w="19050">
+                  <a:headEnd type="none" w="med" len="med"/>
+                  <a:tailEnd type="triangle" w="med" len="med"/>
+                </a:ln>
+              </p:spPr>
+              <p:style>
+                <a:lnRef idx="1">
+                  <a:schemeClr val="accent1"/>
+                </a:lnRef>
+                <a:fillRef idx="0">
+                  <a:schemeClr val="accent1"/>
+                </a:fillRef>
+                <a:effectRef idx="0">
+                  <a:schemeClr val="accent1"/>
+                </a:effectRef>
+                <a:fontRef idx="minor">
+                  <a:schemeClr val="tx1"/>
+                </a:fontRef>
+              </p:style>
+            </p:cxnSp>
+            <p:cxnSp>
+              <p:nvCxnSpPr>
+                <p:cNvPr id="63" name="Straight Arrow Connector 62"/>
+                <p:cNvCxnSpPr>
+                  <a:stCxn id="20" idx="1"/>
+                  <a:endCxn id="36" idx="3"/>
+                </p:cNvCxnSpPr>
+                <p:nvPr/>
+              </p:nvCxnSpPr>
+              <p:spPr>
+                <a:xfrm flipH="1">
+                  <a:off x="6190284" y="5315435"/>
+                  <a:ext cx="429683" cy="277092"/>
+                </a:xfrm>
+                <a:prstGeom prst="straightConnector1">
+                  <a:avLst/>
+                </a:prstGeom>
+                <a:ln w="19050">
+                  <a:headEnd type="none" w="med" len="med"/>
+                  <a:tailEnd type="triangle" w="med" len="med"/>
+                </a:ln>
+              </p:spPr>
+              <p:style>
+                <a:lnRef idx="1">
+                  <a:schemeClr val="accent1"/>
+                </a:lnRef>
+                <a:fillRef idx="0">
+                  <a:schemeClr val="accent1"/>
+                </a:fillRef>
+                <a:effectRef idx="0">
+                  <a:schemeClr val="accent1"/>
+                </a:effectRef>
+                <a:fontRef idx="minor">
+                  <a:schemeClr val="tx1"/>
+                </a:fontRef>
+              </p:style>
+            </p:cxnSp>
+            <p:cxnSp>
+              <p:nvCxnSpPr>
+                <p:cNvPr id="64" name="Straight Arrow Connector 63"/>
+                <p:cNvCxnSpPr>
+                  <a:stCxn id="18" idx="1"/>
+                  <a:endCxn id="36" idx="3"/>
+                </p:cNvCxnSpPr>
+                <p:nvPr/>
+              </p:nvCxnSpPr>
+              <p:spPr>
+                <a:xfrm flipH="1" flipV="1">
+                  <a:off x="6190284" y="5592527"/>
+                  <a:ext cx="429683" cy="130882"/>
+                </a:xfrm>
+                <a:prstGeom prst="straightConnector1">
+                  <a:avLst/>
+                </a:prstGeom>
+                <a:ln w="19050">
+                  <a:headEnd type="none" w="med" len="med"/>
+                  <a:tailEnd type="triangle" w="med" len="med"/>
+                </a:ln>
+              </p:spPr>
+              <p:style>
+                <a:lnRef idx="1">
+                  <a:schemeClr val="accent1"/>
+                </a:lnRef>
+                <a:fillRef idx="0">
+                  <a:schemeClr val="accent1"/>
+                </a:fillRef>
+                <a:effectRef idx="0">
+                  <a:schemeClr val="accent1"/>
+                </a:effectRef>
+                <a:fontRef idx="minor">
+                  <a:schemeClr val="tx1"/>
+                </a:fontRef>
+              </p:style>
+            </p:cxnSp>
+            <p:sp>
+              <p:nvSpPr>
+                <p:cNvPr id="65" name="TextBox 64"/>
+                <p:cNvSpPr txBox="1"/>
+                <p:nvPr/>
+              </p:nvSpPr>
+              <p:spPr>
+                <a:xfrm>
+                  <a:off x="2142649" y="5523298"/>
+                  <a:ext cx="981551" cy="276999"/>
+                </a:xfrm>
+                <a:prstGeom prst="rect">
+                  <a:avLst/>
+                </a:prstGeom>
+                <a:solidFill>
+                  <a:schemeClr val="accent6">
+                    <a:lumMod val="75000"/>
+                  </a:schemeClr>
+                </a:solidFill>
+                <a:ln w="19050">
+                  <a:solidFill>
+                    <a:schemeClr val="tx2">
+                      <a:lumMod val="60000"/>
+                      <a:lumOff val="40000"/>
+                    </a:schemeClr>
+                  </a:solidFill>
+                  <a:headEnd type="none" w="med" len="med"/>
+                  <a:tailEnd type="triangle" w="med" len="med"/>
+                </a:ln>
+              </p:spPr>
+              <p:txBody>
+                <a:bodyPr wrap="square" rtlCol="0">
+                  <a:spAutoFit/>
+                </a:bodyPr>
+                <a:lstStyle/>
+                <a:p>
+                  <a:pPr algn="ctr"/>
+                  <a:r>
+                    <a:rPr lang="en-US" sz="1200" dirty="0" smtClean="0">
+                      <a:solidFill>
+                        <a:schemeClr val="bg1"/>
+                      </a:solidFill>
+                    </a:rPr>
+                    <a:t>process</a:t>
+                  </a:r>
+                </a:p>
+              </p:txBody>
+            </p:sp>
+            <p:cxnSp>
+              <p:nvCxnSpPr>
+                <p:cNvPr id="66" name="Straight Arrow Connector 65"/>
+                <p:cNvCxnSpPr>
+                  <a:stCxn id="65" idx="1"/>
+                  <a:endCxn id="12" idx="3"/>
+                </p:cNvCxnSpPr>
+                <p:nvPr/>
+              </p:nvCxnSpPr>
+              <p:spPr>
+                <a:xfrm flipH="1">
+                  <a:off x="1905000" y="5661798"/>
+                  <a:ext cx="237649" cy="0"/>
+                </a:xfrm>
+                <a:prstGeom prst="straightConnector1">
+                  <a:avLst/>
+                </a:prstGeom>
+                <a:ln w="19050">
+                  <a:headEnd type="none" w="med" len="med"/>
+                  <a:tailEnd type="triangle" w="med" len="med"/>
+                </a:ln>
+              </p:spPr>
+              <p:style>
+                <a:lnRef idx="1">
+                  <a:schemeClr val="accent1"/>
+                </a:lnRef>
+                <a:fillRef idx="0">
+                  <a:schemeClr val="accent1"/>
+                </a:fillRef>
+                <a:effectRef idx="0">
+                  <a:schemeClr val="accent1"/>
+                </a:effectRef>
+                <a:fontRef idx="minor">
+                  <a:schemeClr val="tx1"/>
+                </a:fontRef>
+              </p:style>
+            </p:cxnSp>
+            <p:sp>
+              <p:nvSpPr>
+                <p:cNvPr id="67" name="TextBox 66"/>
+                <p:cNvSpPr txBox="1"/>
+                <p:nvPr/>
+              </p:nvSpPr>
+              <p:spPr>
+                <a:xfrm>
+                  <a:off x="2142649" y="2407638"/>
+                  <a:ext cx="981551" cy="646331"/>
+                </a:xfrm>
+                <a:prstGeom prst="rect">
+                  <a:avLst/>
+                </a:prstGeom>
+                <a:solidFill>
+                  <a:schemeClr val="accent6">
+                    <a:lumMod val="75000"/>
+                  </a:schemeClr>
+                </a:solidFill>
+                <a:ln w="19050">
+                  <a:solidFill>
+                    <a:schemeClr val="tx2">
+                      <a:lumMod val="60000"/>
+                      <a:lumOff val="40000"/>
+                    </a:schemeClr>
+                  </a:solidFill>
+                  <a:headEnd type="none" w="med" len="med"/>
+                  <a:tailEnd type="triangle" w="med" len="med"/>
+                </a:ln>
+              </p:spPr>
+              <p:txBody>
+                <a:bodyPr wrap="square" rtlCol="0">
+                  <a:spAutoFit/>
+                </a:bodyPr>
+                <a:lstStyle/>
+                <a:p>
+                  <a:pPr algn="ctr"/>
+                  <a:r>
+                    <a:rPr lang="en-US" sz="1200" dirty="0">
+                      <a:solidFill>
+                        <a:schemeClr val="bg1"/>
+                      </a:solidFill>
+                    </a:rPr>
+                    <a:t>s</a:t>
+                  </a:r>
+                  <a:r>
+                    <a:rPr lang="en-US" sz="1200" dirty="0" smtClean="0">
+                      <a:solidFill>
+                        <a:schemeClr val="bg1"/>
+                      </a:solidFill>
+                    </a:rPr>
+                    <a:t>pecifically</a:t>
+                  </a:r>
+                </a:p>
+                <a:p>
+                  <a:pPr algn="ctr"/>
+                  <a:r>
+                    <a:rPr lang="en-US" sz="1200" dirty="0">
+                      <a:solidFill>
+                        <a:schemeClr val="bg1"/>
+                      </a:solidFill>
+                    </a:rPr>
+                    <a:t>d</a:t>
+                  </a:r>
+                  <a:r>
+                    <a:rPr lang="en-US" sz="1200" dirty="0" smtClean="0">
+                      <a:solidFill>
+                        <a:schemeClr val="bg1"/>
+                      </a:solidFill>
+                    </a:rPr>
+                    <a:t>ependent</a:t>
+                  </a:r>
+                </a:p>
+                <a:p>
+                  <a:pPr algn="ctr"/>
+                  <a:r>
+                    <a:rPr lang="en-US" sz="1200" dirty="0" smtClean="0">
+                      <a:solidFill>
+                        <a:schemeClr val="bg1"/>
+                      </a:solidFill>
+                    </a:rPr>
+                    <a:t>continuant</a:t>
+                  </a:r>
+                </a:p>
+              </p:txBody>
+            </p:sp>
+            <p:sp>
+              <p:nvSpPr>
+                <p:cNvPr id="68" name="TextBox 67"/>
+                <p:cNvSpPr txBox="1"/>
+                <p:nvPr/>
+              </p:nvSpPr>
+              <p:spPr>
+                <a:xfrm>
+                  <a:off x="2142649" y="3303740"/>
+                  <a:ext cx="981551" cy="461665"/>
+                </a:xfrm>
+                <a:prstGeom prst="rect">
+                  <a:avLst/>
+                </a:prstGeom>
+                <a:solidFill>
+                  <a:schemeClr val="accent6">
+                    <a:lumMod val="75000"/>
+                  </a:schemeClr>
+                </a:solidFill>
+                <a:ln w="19050">
+                  <a:solidFill>
+                    <a:schemeClr val="tx2">
+                      <a:lumMod val="60000"/>
+                      <a:lumOff val="40000"/>
+                    </a:schemeClr>
+                  </a:solidFill>
+                  <a:headEnd type="none" w="med" len="med"/>
+                  <a:tailEnd type="triangle" w="med" len="med"/>
+                </a:ln>
+              </p:spPr>
+              <p:txBody>
+                <a:bodyPr wrap="none" rtlCol="0">
+                  <a:spAutoFit/>
+                </a:bodyPr>
+                <a:lstStyle/>
+                <a:p>
+                  <a:pPr algn="ctr"/>
+                  <a:r>
+                    <a:rPr lang="en-US" sz="1200" dirty="0">
+                      <a:solidFill>
+                        <a:schemeClr val="bg1"/>
+                      </a:solidFill>
+                    </a:rPr>
+                    <a:t>i</a:t>
+                  </a:r>
+                  <a:r>
+                    <a:rPr lang="en-US" sz="1200" dirty="0" smtClean="0">
+                      <a:solidFill>
+                        <a:schemeClr val="bg1"/>
+                      </a:solidFill>
+                    </a:rPr>
+                    <a:t>ndependent</a:t>
+                  </a:r>
+                </a:p>
+                <a:p>
+                  <a:pPr algn="ctr"/>
+                  <a:r>
+                    <a:rPr lang="en-US" sz="1200" dirty="0" smtClean="0">
+                      <a:solidFill>
+                        <a:schemeClr val="bg1"/>
+                      </a:solidFill>
+                    </a:rPr>
+                    <a:t>continuant</a:t>
+                  </a:r>
+                </a:p>
+              </p:txBody>
+            </p:sp>
+            <p:sp>
+              <p:nvSpPr>
+                <p:cNvPr id="69" name="TextBox 68"/>
+                <p:cNvSpPr txBox="1"/>
+                <p:nvPr/>
+              </p:nvSpPr>
+              <p:spPr>
+                <a:xfrm>
+                  <a:off x="2142649" y="1578132"/>
+                  <a:ext cx="981551" cy="646331"/>
+                </a:xfrm>
+                <a:prstGeom prst="rect">
+                  <a:avLst/>
+                </a:prstGeom>
+                <a:solidFill>
+                  <a:schemeClr val="accent6">
+                    <a:lumMod val="75000"/>
+                  </a:schemeClr>
+                </a:solidFill>
+                <a:ln w="19050">
+                  <a:solidFill>
+                    <a:schemeClr val="tx2">
+                      <a:lumMod val="60000"/>
+                      <a:lumOff val="40000"/>
+                    </a:schemeClr>
+                  </a:solidFill>
+                  <a:headEnd type="none" w="med" len="med"/>
+                  <a:tailEnd type="triangle" w="med" len="med"/>
+                </a:ln>
+              </p:spPr>
+              <p:txBody>
+                <a:bodyPr wrap="square" rtlCol="0">
+                  <a:spAutoFit/>
+                </a:bodyPr>
+                <a:lstStyle/>
+                <a:p>
+                  <a:pPr algn="ctr"/>
+                  <a:r>
+                    <a:rPr lang="en-US" sz="1200" dirty="0" smtClean="0">
+                      <a:solidFill>
+                        <a:schemeClr val="bg1"/>
+                      </a:solidFill>
+                    </a:rPr>
+                    <a:t>generically</a:t>
+                  </a:r>
+                </a:p>
+                <a:p>
+                  <a:pPr algn="ctr"/>
+                  <a:r>
+                    <a:rPr lang="en-US" sz="1200" dirty="0" smtClean="0">
+                      <a:solidFill>
+                        <a:schemeClr val="bg1"/>
+                      </a:solidFill>
+                    </a:rPr>
+                    <a:t>dependent </a:t>
+                  </a:r>
+                </a:p>
+                <a:p>
+                  <a:pPr algn="ctr"/>
+                  <a:r>
+                    <a:rPr lang="en-US" sz="1200" dirty="0" smtClean="0">
+                      <a:solidFill>
+                        <a:schemeClr val="bg1"/>
+                      </a:solidFill>
+                    </a:rPr>
+                    <a:t>continuant</a:t>
+                  </a:r>
+                </a:p>
+              </p:txBody>
+            </p:sp>
+            <p:cxnSp>
+              <p:nvCxnSpPr>
+                <p:cNvPr id="70" name="Straight Arrow Connector 69"/>
+                <p:cNvCxnSpPr>
+                  <a:stCxn id="69" idx="1"/>
+                  <a:endCxn id="11" idx="3"/>
+                </p:cNvCxnSpPr>
+                <p:nvPr/>
+              </p:nvCxnSpPr>
+              <p:spPr>
+                <a:xfrm flipH="1">
+                  <a:off x="1905000" y="1901298"/>
+                  <a:ext cx="237649" cy="827909"/>
+                </a:xfrm>
+                <a:prstGeom prst="straightConnector1">
+                  <a:avLst/>
+                </a:prstGeom>
+                <a:ln w="19050">
+                  <a:headEnd type="none" w="med" len="med"/>
+                  <a:tailEnd type="triangle" w="med" len="med"/>
+                </a:ln>
+              </p:spPr>
+              <p:style>
+                <a:lnRef idx="1">
+                  <a:schemeClr val="accent1"/>
+                </a:lnRef>
+                <a:fillRef idx="0">
+                  <a:schemeClr val="accent1"/>
+                </a:fillRef>
+                <a:effectRef idx="0">
+                  <a:schemeClr val="accent1"/>
+                </a:effectRef>
+                <a:fontRef idx="minor">
+                  <a:schemeClr val="tx1"/>
+                </a:fontRef>
+              </p:style>
+            </p:cxnSp>
+            <p:cxnSp>
+              <p:nvCxnSpPr>
+                <p:cNvPr id="71" name="Straight Arrow Connector 70"/>
+                <p:cNvCxnSpPr>
+                  <a:stCxn id="38" idx="1"/>
+                  <a:endCxn id="68" idx="3"/>
+                </p:cNvCxnSpPr>
+                <p:nvPr/>
+              </p:nvCxnSpPr>
+              <p:spPr>
+                <a:xfrm flipH="1">
+                  <a:off x="3124200" y="3534573"/>
+                  <a:ext cx="193496" cy="0"/>
+                </a:xfrm>
+                <a:prstGeom prst="straightConnector1">
+                  <a:avLst/>
+                </a:prstGeom>
+                <a:ln w="19050">
+                  <a:headEnd type="none" w="med" len="med"/>
+                  <a:tailEnd type="triangle" w="med" len="med"/>
+                </a:ln>
+              </p:spPr>
+              <p:style>
+                <a:lnRef idx="1">
+                  <a:schemeClr val="accent1"/>
+                </a:lnRef>
+                <a:fillRef idx="0">
+                  <a:schemeClr val="accent1"/>
+                </a:fillRef>
+                <a:effectRef idx="0">
+                  <a:schemeClr val="accent1"/>
+                </a:effectRef>
+                <a:fontRef idx="minor">
+                  <a:schemeClr val="tx1"/>
+                </a:fontRef>
+              </p:style>
+            </p:cxnSp>
+            <p:cxnSp>
+              <p:nvCxnSpPr>
+                <p:cNvPr id="72" name="Straight Arrow Connector 71"/>
+                <p:cNvCxnSpPr>
+                  <a:stCxn id="67" idx="1"/>
+                  <a:endCxn id="11" idx="3"/>
+                </p:cNvCxnSpPr>
+                <p:nvPr/>
+              </p:nvCxnSpPr>
+              <p:spPr>
+                <a:xfrm flipH="1" flipV="1">
+                  <a:off x="1905000" y="2729207"/>
+                  <a:ext cx="237649" cy="1597"/>
+                </a:xfrm>
+                <a:prstGeom prst="straightConnector1">
+                  <a:avLst/>
+                </a:prstGeom>
+                <a:ln w="19050">
+                  <a:headEnd type="none" w="med" len="med"/>
+                  <a:tailEnd type="triangle" w="med" len="med"/>
+                </a:ln>
+              </p:spPr>
+              <p:style>
+                <a:lnRef idx="1">
+                  <a:schemeClr val="accent1"/>
+                </a:lnRef>
+                <a:fillRef idx="0">
+                  <a:schemeClr val="accent1"/>
+                </a:fillRef>
+                <a:effectRef idx="0">
+                  <a:schemeClr val="accent1"/>
+                </a:effectRef>
+                <a:fontRef idx="minor">
+                  <a:schemeClr val="tx1"/>
+                </a:fontRef>
+              </p:style>
+            </p:cxnSp>
+          </p:grpSp>
+        </p:grpSp>
+        <p:sp>
+          <p:nvSpPr>
+            <p:cNvPr id="4" name="TextBox 3"/>
+            <p:cNvSpPr txBox="1"/>
+            <p:nvPr/>
+          </p:nvSpPr>
+          <p:spPr>
+            <a:xfrm>
+              <a:off x="3308460" y="2485121"/>
+              <a:ext cx="1101904" cy="276999"/>
+            </a:xfrm>
+            <a:prstGeom prst="rect">
+              <a:avLst/>
+            </a:prstGeom>
+            <a:solidFill>
+              <a:schemeClr val="accent6">
+                <a:lumMod val="75000"/>
+              </a:schemeClr>
+            </a:solidFill>
+            <a:ln w="19050">
+              <a:solidFill>
+                <a:schemeClr val="tx2">
+                  <a:lumMod val="60000"/>
+                  <a:lumOff val="40000"/>
+                </a:schemeClr>
+              </a:solidFill>
+              <a:headEnd type="none" w="med" len="med"/>
+              <a:tailEnd type="triangle" w="med" len="med"/>
+            </a:ln>
+          </p:spPr>
+          <p:txBody>
+            <a:bodyPr wrap="square" rtlCol="0">
+              <a:spAutoFit/>
+            </a:bodyPr>
+            <a:lstStyle/>
+            <a:p>
+              <a:pPr algn="ctr"/>
+              <a:r>
+                <a:rPr lang="en-US" sz="1200" dirty="0" smtClean="0">
+                  <a:solidFill>
+                    <a:schemeClr val="bg1"/>
+                  </a:solidFill>
+                </a:rPr>
+                <a:t>quality</a:t>
+              </a:r>
+            </a:p>
+          </p:txBody>
+        </p:sp>
+        <p:cxnSp>
+          <p:nvCxnSpPr>
+            <p:cNvPr id="5" name="Straight Arrow Connector 4"/>
+            <p:cNvCxnSpPr>
+              <a:endCxn id="4" idx="1"/>
+            </p:cNvCxnSpPr>
+            <p:nvPr/>
+          </p:nvCxnSpPr>
+          <p:spPr>
+            <a:xfrm flipV="1">
+              <a:off x="3114964" y="2623621"/>
+              <a:ext cx="193496" cy="170688"/>
+            </a:xfrm>
+            <a:prstGeom prst="straightConnector1">
+              <a:avLst/>
+            </a:prstGeom>
+            <a:ln w="19050">
+              <a:headEnd type="triangle" w="med" len="med"/>
+              <a:tailEnd type="none" w="med" len="med"/>
+            </a:ln>
+          </p:spPr>
+          <p:style>
+            <a:lnRef idx="1">
+              <a:schemeClr val="accent1"/>
+            </a:lnRef>
+            <a:fillRef idx="0">
+              <a:schemeClr val="accent1"/>
+            </a:fillRef>
+            <a:effectRef idx="0">
+              <a:schemeClr val="accent1"/>
+            </a:effectRef>
+            <a:fontRef idx="minor">
+              <a:schemeClr val="tx1"/>
+            </a:fontRef>
+          </p:style>
+        </p:cxnSp>
+        <p:sp>
+          <p:nvSpPr>
+            <p:cNvPr id="6" name="TextBox 5"/>
+            <p:cNvSpPr txBox="1"/>
+            <p:nvPr/>
+          </p:nvSpPr>
+          <p:spPr>
+            <a:xfrm>
+              <a:off x="3308460" y="2839951"/>
+              <a:ext cx="1101904" cy="276999"/>
+            </a:xfrm>
+            <a:prstGeom prst="rect">
+              <a:avLst/>
+            </a:prstGeom>
+            <a:solidFill>
+              <a:schemeClr val="accent6">
+                <a:lumMod val="75000"/>
+              </a:schemeClr>
+            </a:solidFill>
+            <a:ln w="19050">
+              <a:solidFill>
+                <a:schemeClr val="tx2">
+                  <a:lumMod val="60000"/>
+                  <a:lumOff val="40000"/>
+                </a:schemeClr>
+              </a:solidFill>
+              <a:headEnd type="none" w="med" len="med"/>
+              <a:tailEnd type="triangle" w="med" len="med"/>
+            </a:ln>
+          </p:spPr>
+          <p:txBody>
+            <a:bodyPr wrap="square" rtlCol="0">
+              <a:spAutoFit/>
+            </a:bodyPr>
+            <a:lstStyle/>
+            <a:p>
+              <a:pPr algn="ctr"/>
+              <a:r>
+                <a:rPr lang="en-US" sz="1200" dirty="0" smtClean="0">
+                  <a:solidFill>
+                    <a:schemeClr val="bg1"/>
+                  </a:solidFill>
+                </a:rPr>
+                <a:t>role</a:t>
+              </a:r>
+            </a:p>
+          </p:txBody>
+        </p:sp>
+        <p:cxnSp>
+          <p:nvCxnSpPr>
+            <p:cNvPr id="7" name="Straight Arrow Connector 6"/>
+            <p:cNvCxnSpPr>
+              <a:stCxn id="67" idx="3"/>
+              <a:endCxn id="6" idx="1"/>
+            </p:cNvCxnSpPr>
+            <p:nvPr/>
+          </p:nvCxnSpPr>
+          <p:spPr>
+            <a:xfrm>
+              <a:off x="3114964" y="2807004"/>
+              <a:ext cx="193496" cy="171447"/>
+            </a:xfrm>
+            <a:prstGeom prst="straightConnector1">
+              <a:avLst/>
+            </a:prstGeom>
+            <a:ln w="19050">
+              <a:headEnd type="triangle" w="med" len="med"/>
+              <a:tailEnd type="none" w="med" len="med"/>
+            </a:ln>
+          </p:spPr>
+          <p:style>
+            <a:lnRef idx="1">
+              <a:schemeClr val="accent1"/>
+            </a:lnRef>
+            <a:fillRef idx="0">
+              <a:schemeClr val="accent1"/>
+            </a:fillRef>
+            <a:effectRef idx="0">
+              <a:schemeClr val="accent1"/>
+            </a:effectRef>
+            <a:fontRef idx="minor">
+              <a:schemeClr val="tx1"/>
+            </a:fontRef>
+          </p:style>
+        </p:cxnSp>
+      </p:grpSp>
+    </p:spTree>
+    <p:extLst>
+      <p:ext uri="{BB962C8B-B14F-4D97-AF65-F5344CB8AC3E}">
+        <p14:creationId xmlns:p14="http://schemas.microsoft.com/office/powerpoint/2010/main" val="410033320"/>
+      </p:ext>
+    </p:extLst>
+  </p:cSld>
+  <p:clrMapOvr>
+    <a:masterClrMapping/>
+  </p:clrMapOvr>
+</p:sld>
+</file>
+
+<file path=ppt/slides/slide2.xml><?xml version="1.0" encoding="utf-8"?>
+<p:sld xmlns:a="http://schemas.openxmlformats.org/drawingml/2006/main" xmlns:r="http://schemas.openxmlformats.org/officeDocument/2006/relationships" xmlns:p="http://schemas.openxmlformats.org/presentationml/2006/main">
+  <p:cSld>
+    <p:spTree>
+      <p:nvGrpSpPr>
+        <p:cNvPr id="1" name=""/>
+        <p:cNvGrpSpPr/>
+        <p:nvPr/>
+      </p:nvGrpSpPr>
+      <p:grpSpPr>
+        <a:xfrm>
+          <a:off x="0" y="0"/>
+          <a:ext cx="0" cy="0"/>
+          <a:chOff x="0" y="0"/>
+          <a:chExt cx="0" cy="0"/>
+        </a:xfrm>
+      </p:grpSpPr>
       <p:sp>
         <p:nvSpPr>
           <p:cNvPr id="10" name="Rounded Rectangle 9"/>
@@ -5438,7 +8979,7 @@
 </p:sld>
 </file>
 
-<file path=ppt/slides/slide2.xml><?xml version="1.0" encoding="utf-8"?>
+<file path=ppt/slides/slide3.xml><?xml version="1.0" encoding="utf-8"?>
 <p:sld xmlns:a="http://schemas.openxmlformats.org/drawingml/2006/main" xmlns:r="http://schemas.openxmlformats.org/officeDocument/2006/relationships" xmlns:p="http://schemas.openxmlformats.org/presentationml/2006/main">
   <p:cSld>
     <p:spTree>

</xml_diff>

<commit_message>
textual entity removed from Figure 1 based on Bjoern's suggestion
</commit_message>
<xml_diff>
--- a/docs/papers/release/Figure 1.pptx
+++ b/docs/papers/release/Figure 1.pptx
@@ -195,7 +195,7 @@
             <a:fld id="{DCB0F01B-B7FE-4268-A005-AB7D5822BC14}" type="datetimeFigureOut">
               <a:rPr lang="en-US" smtClean="0"/>
               <a:pPr/>
-              <a:t>5/29/2015</a:t>
+              <a:t>6/1/2015</a:t>
             </a:fld>
             <a:endParaRPr lang="en-US"/>
           </a:p>
@@ -812,7 +812,7 @@
             <a:fld id="{1D8BD707-D9CF-40AE-B4C6-C98DA3205C09}" type="datetimeFigureOut">
               <a:rPr lang="en-US" smtClean="0"/>
               <a:pPr/>
-              <a:t>5/29/2015</a:t>
+              <a:t>6/1/2015</a:t>
             </a:fld>
             <a:endParaRPr lang="en-US"/>
           </a:p>
@@ -979,7 +979,7 @@
             <a:fld id="{1D8BD707-D9CF-40AE-B4C6-C98DA3205C09}" type="datetimeFigureOut">
               <a:rPr lang="en-US" smtClean="0"/>
               <a:pPr/>
-              <a:t>5/29/2015</a:t>
+              <a:t>6/1/2015</a:t>
             </a:fld>
             <a:endParaRPr lang="en-US"/>
           </a:p>
@@ -1156,7 +1156,7 @@
             <a:fld id="{1D8BD707-D9CF-40AE-B4C6-C98DA3205C09}" type="datetimeFigureOut">
               <a:rPr lang="en-US" smtClean="0"/>
               <a:pPr/>
-              <a:t>5/29/2015</a:t>
+              <a:t>6/1/2015</a:t>
             </a:fld>
             <a:endParaRPr lang="en-US"/>
           </a:p>
@@ -1323,7 +1323,7 @@
             <a:fld id="{1D8BD707-D9CF-40AE-B4C6-C98DA3205C09}" type="datetimeFigureOut">
               <a:rPr lang="en-US" smtClean="0"/>
               <a:pPr/>
-              <a:t>5/29/2015</a:t>
+              <a:t>6/1/2015</a:t>
             </a:fld>
             <a:endParaRPr lang="en-US"/>
           </a:p>
@@ -1566,7 +1566,7 @@
             <a:fld id="{1D8BD707-D9CF-40AE-B4C6-C98DA3205C09}" type="datetimeFigureOut">
               <a:rPr lang="en-US" smtClean="0"/>
               <a:pPr/>
-              <a:t>5/29/2015</a:t>
+              <a:t>6/1/2015</a:t>
             </a:fld>
             <a:endParaRPr lang="en-US"/>
           </a:p>
@@ -1851,7 +1851,7 @@
             <a:fld id="{1D8BD707-D9CF-40AE-B4C6-C98DA3205C09}" type="datetimeFigureOut">
               <a:rPr lang="en-US" smtClean="0"/>
               <a:pPr/>
-              <a:t>5/29/2015</a:t>
+              <a:t>6/1/2015</a:t>
             </a:fld>
             <a:endParaRPr lang="en-US"/>
           </a:p>
@@ -2270,7 +2270,7 @@
             <a:fld id="{1D8BD707-D9CF-40AE-B4C6-C98DA3205C09}" type="datetimeFigureOut">
               <a:rPr lang="en-US" smtClean="0"/>
               <a:pPr/>
-              <a:t>5/29/2015</a:t>
+              <a:t>6/1/2015</a:t>
             </a:fld>
             <a:endParaRPr lang="en-US"/>
           </a:p>
@@ -2385,7 +2385,7 @@
             <a:fld id="{1D8BD707-D9CF-40AE-B4C6-C98DA3205C09}" type="datetimeFigureOut">
               <a:rPr lang="en-US" smtClean="0"/>
               <a:pPr/>
-              <a:t>5/29/2015</a:t>
+              <a:t>6/1/2015</a:t>
             </a:fld>
             <a:endParaRPr lang="en-US"/>
           </a:p>
@@ -2477,7 +2477,7 @@
             <a:fld id="{1D8BD707-D9CF-40AE-B4C6-C98DA3205C09}" type="datetimeFigureOut">
               <a:rPr lang="en-US" smtClean="0"/>
               <a:pPr/>
-              <a:t>5/29/2015</a:t>
+              <a:t>6/1/2015</a:t>
             </a:fld>
             <a:endParaRPr lang="en-US"/>
           </a:p>
@@ -2751,7 +2751,7 @@
             <a:fld id="{1D8BD707-D9CF-40AE-B4C6-C98DA3205C09}" type="datetimeFigureOut">
               <a:rPr lang="en-US" smtClean="0"/>
               <a:pPr/>
-              <a:t>5/29/2015</a:t>
+              <a:t>6/1/2015</a:t>
             </a:fld>
             <a:endParaRPr lang="en-US"/>
           </a:p>
@@ -3001,7 +3001,7 @@
             <a:fld id="{1D8BD707-D9CF-40AE-B4C6-C98DA3205C09}" type="datetimeFigureOut">
               <a:rPr lang="en-US" smtClean="0"/>
               <a:pPr/>
-              <a:t>5/29/2015</a:t>
+              <a:t>6/1/2015</a:t>
             </a:fld>
             <a:endParaRPr lang="en-US"/>
           </a:p>
@@ -3211,7 +3211,7 @@
             <a:fld id="{1D8BD707-D9CF-40AE-B4C6-C98DA3205C09}" type="datetimeFigureOut">
               <a:rPr lang="en-US" smtClean="0"/>
               <a:pPr/>
-              <a:t>5/29/2015</a:t>
+              <a:t>6/1/2015</a:t>
             </a:fld>
             <a:endParaRPr lang="en-US"/>
           </a:p>
@@ -3590,10 +3590,10 @@
         </p:nvGrpSpPr>
         <p:grpSpPr>
           <a:xfrm>
-            <a:off x="200706" y="1066800"/>
-            <a:ext cx="8747352" cy="4957372"/>
-            <a:chOff x="235012" y="1066800"/>
-            <a:chExt cx="8747352" cy="4957372"/>
+            <a:off x="200706" y="1228725"/>
+            <a:ext cx="8747352" cy="4795447"/>
+            <a:chOff x="235012" y="1228725"/>
+            <a:chExt cx="8747352" cy="4795447"/>
           </a:xfrm>
         </p:grpSpPr>
         <p:grpSp>
@@ -3604,10 +3604,10 @@
           </p:nvGrpSpPr>
           <p:grpSpPr>
             <a:xfrm>
-              <a:off x="235012" y="1066800"/>
-              <a:ext cx="8747352" cy="4957372"/>
-              <a:chOff x="235012" y="1371600"/>
-              <a:chExt cx="8747352" cy="4957372"/>
+              <a:off x="235012" y="1228725"/>
+              <a:ext cx="8747352" cy="4795447"/>
+              <a:chOff x="235012" y="1533525"/>
+              <a:chExt cx="8747352" cy="4795447"/>
             </a:xfrm>
           </p:grpSpPr>
           <p:grpSp>
@@ -3618,10 +3618,10 @@
             </p:nvGrpSpPr>
             <p:grpSpPr>
               <a:xfrm>
-                <a:off x="235012" y="1371600"/>
-                <a:ext cx="8747352" cy="4957372"/>
-                <a:chOff x="244248" y="1295400"/>
-                <a:chExt cx="8747352" cy="4957372"/>
+                <a:off x="235012" y="1533525"/>
+                <a:ext cx="8747352" cy="4795447"/>
+                <a:chOff x="244248" y="1457325"/>
+                <a:chExt cx="8747352" cy="4795447"/>
               </a:xfrm>
             </p:grpSpPr>
             <p:grpSp>
@@ -3919,10 +3919,10 @@
               </p:nvGrpSpPr>
               <p:grpSpPr>
                 <a:xfrm>
-                  <a:off x="244248" y="1295400"/>
-                  <a:ext cx="7909152" cy="4957372"/>
-                  <a:chOff x="244248" y="1295400"/>
-                  <a:chExt cx="7909152" cy="4957372"/>
+                  <a:off x="244248" y="1457325"/>
+                  <a:ext cx="7909152" cy="4795447"/>
+                  <a:chOff x="244248" y="1457325"/>
+                  <a:chExt cx="7909152" cy="4795447"/>
                 </a:xfrm>
               </p:grpSpPr>
               <p:sp>
@@ -4222,7 +4222,7 @@
                 </p:nvSpPr>
                 <p:spPr>
                   <a:xfrm>
-                    <a:off x="4753255" y="1295400"/>
+                    <a:off x="4753255" y="1457325"/>
                     <a:ext cx="780855" cy="276999"/>
                   </a:xfrm>
                   <a:prstGeom prst="rect">
@@ -4451,7 +4451,7 @@
                 </p:nvSpPr>
                 <p:spPr>
                   <a:xfrm>
-                    <a:off x="4753255" y="2211509"/>
+                    <a:off x="4753255" y="2066151"/>
                     <a:ext cx="1275222" cy="276999"/>
                   </a:xfrm>
                   <a:prstGeom prst="rect">
@@ -4603,7 +4603,7 @@
                 </p:nvSpPr>
                 <p:spPr>
                   <a:xfrm>
-                    <a:off x="4753255" y="1600200"/>
+                    <a:off x="4753255" y="1761351"/>
                     <a:ext cx="822854" cy="276999"/>
                   </a:xfrm>
                   <a:prstGeom prst="rect">
@@ -4637,65 +4637,6 @@
                       </a:rPr>
                       <a:t>document</a:t>
                     </a:r>
-                  </a:p>
-                </p:txBody>
-              </p:sp>
-              <p:sp>
-                <p:nvSpPr>
-                  <p:cNvPr id="103" name="TextBox 102"/>
-                  <p:cNvSpPr txBox="1"/>
-                  <p:nvPr/>
-                </p:nvSpPr>
-                <p:spPr>
-                  <a:xfrm>
-                    <a:off x="4753255" y="1901298"/>
-                    <a:ext cx="1014893" cy="276999"/>
-                  </a:xfrm>
-                  <a:prstGeom prst="rect">
-                    <a:avLst/>
-                  </a:prstGeom>
-                  <a:solidFill>
-                    <a:srgbClr val="7030A0"/>
-                  </a:solidFill>
-                  <a:ln w="19050">
-                    <a:solidFill>
-                      <a:schemeClr val="tx2">
-                        <a:lumMod val="60000"/>
-                        <a:lumOff val="40000"/>
-                      </a:schemeClr>
-                    </a:solidFill>
-                    <a:headEnd type="none" w="med" len="med"/>
-                    <a:tailEnd type="triangle" w="med" len="med"/>
-                  </a:ln>
-                </p:spPr>
-                <p:txBody>
-                  <a:bodyPr wrap="none" rtlCol="0">
-                    <a:spAutoFit/>
-                  </a:bodyPr>
-                  <a:lstStyle/>
-                  <a:p>
-                    <a:pPr algn="ctr"/>
-                    <a:r>
-                      <a:rPr lang="en-US" sz="1200" dirty="0">
-                        <a:solidFill>
-                          <a:schemeClr val="bg1"/>
-                        </a:solidFill>
-                      </a:rPr>
-                      <a:t>t</a:t>
-                    </a:r>
-                    <a:r>
-                      <a:rPr lang="en-US" sz="1200" dirty="0" smtClean="0">
-                        <a:solidFill>
-                          <a:schemeClr val="bg1"/>
-                        </a:solidFill>
-                      </a:rPr>
-                      <a:t>extual entity</a:t>
-                    </a:r>
-                    <a:endParaRPr lang="en-US" sz="1200" dirty="0">
-                      <a:solidFill>
-                        <a:schemeClr val="bg1"/>
-                      </a:solidFill>
-                    </a:endParaRPr>
                   </a:p>
                 </p:txBody>
               </p:sp>
@@ -4881,8 +4822,8 @@
                 </p:nvCxnSpPr>
                 <p:spPr>
                   <a:xfrm flipH="1">
-                    <a:off x="4419600" y="1433900"/>
-                    <a:ext cx="333655" cy="467398"/>
+                    <a:off x="4419600" y="1595825"/>
+                    <a:ext cx="333655" cy="305473"/>
                   </a:xfrm>
                   <a:prstGeom prst="straightConnector1">
                     <a:avLst/>
@@ -4925,7 +4866,7 @@
                 <p:spPr>
                   <a:xfrm flipH="1" flipV="1">
                     <a:off x="4419600" y="1901298"/>
-                    <a:ext cx="333655" cy="448711"/>
+                    <a:ext cx="333655" cy="303353"/>
                   </a:xfrm>
                   <a:prstGeom prst="straightConnector1">
                     <a:avLst/>
@@ -4967,8 +4908,8 @@
                 </p:nvCxnSpPr>
                 <p:spPr>
                   <a:xfrm flipH="1">
-                    <a:off x="4419600" y="1738700"/>
-                    <a:ext cx="333655" cy="162598"/>
+                    <a:off x="4419600" y="1899851"/>
+                    <a:ext cx="333655" cy="1447"/>
                   </a:xfrm>
                   <a:prstGeom prst="straightConnector1">
                     <a:avLst/>
@@ -5098,49 +5039,6 @@
                   <a:xfrm flipH="1" flipV="1">
                     <a:off x="4419600" y="5336140"/>
                     <a:ext cx="339202" cy="463240"/>
-                  </a:xfrm>
-                  <a:prstGeom prst="straightConnector1">
-                    <a:avLst/>
-                  </a:prstGeom>
-                  <a:ln w="19050">
-                    <a:solidFill>
-                      <a:schemeClr val="tx2">
-                        <a:lumMod val="60000"/>
-                        <a:lumOff val="40000"/>
-                      </a:schemeClr>
-                    </a:solidFill>
-                    <a:headEnd type="none" w="med" len="med"/>
-                    <a:tailEnd type="triangle" w="med" len="med"/>
-                  </a:ln>
-                </p:spPr>
-                <p:style>
-                  <a:lnRef idx="1">
-                    <a:schemeClr val="accent1"/>
-                  </a:lnRef>
-                  <a:fillRef idx="0">
-                    <a:schemeClr val="accent1"/>
-                  </a:fillRef>
-                  <a:effectRef idx="0">
-                    <a:schemeClr val="accent1"/>
-                  </a:effectRef>
-                  <a:fontRef idx="minor">
-                    <a:schemeClr val="tx1"/>
-                  </a:fontRef>
-                </p:style>
-              </p:cxnSp>
-              <p:cxnSp>
-                <p:nvCxnSpPr>
-                  <p:cNvPr id="114" name="Straight Arrow Connector 113"/>
-                  <p:cNvCxnSpPr>
-                    <a:stCxn id="103" idx="1"/>
-                    <a:endCxn id="93" idx="3"/>
-                  </p:cNvCxnSpPr>
-                  <p:nvPr/>
-                </p:nvCxnSpPr>
-                <p:spPr>
-                  <a:xfrm flipH="1" flipV="1">
-                    <a:off x="4419600" y="1901298"/>
-                    <a:ext cx="333655" cy="138500"/>
                   </a:xfrm>
                   <a:prstGeom prst="straightConnector1">
                     <a:avLst/>
@@ -6352,7 +6250,7 @@
                 </p:nvSpPr>
                 <p:spPr>
                   <a:xfrm>
-                    <a:off x="6619967" y="2211509"/>
+                    <a:off x="6619967" y="2057400"/>
                     <a:ext cx="965201" cy="276999"/>
                   </a:xfrm>
                   <a:prstGeom prst="rect">
@@ -6413,7 +6311,7 @@
                 </p:nvCxnSpPr>
                 <p:spPr>
                   <a:xfrm flipH="1">
-                    <a:off x="6028477" y="2350008"/>
+                    <a:off x="6028477" y="2195899"/>
                     <a:ext cx="591490" cy="0"/>
                   </a:xfrm>
                   <a:prstGeom prst="straightConnector1">
@@ -6979,11 +6877,6 @@
                   </a:rPr>
                   <a:t>function</a:t>
                 </a:r>
-                <a:endParaRPr lang="en-US" sz="1200" dirty="0" smtClean="0">
-                  <a:solidFill>
-                    <a:schemeClr val="bg1"/>
-                  </a:solidFill>
-                </a:endParaRPr>
               </a:p>
             </p:txBody>
           </p:sp>

</xml_diff>